<commit_message>
JDSZ2AP-22 Wykres oraz wnioski do prezentacji ostatecznej
</commit_message>
<xml_diff>
--- a/Apacze_projekt.pptx
+++ b/Apacze_projekt.pptx
@@ -5,8 +5,8 @@
     <p:sldMasterId id="2147483648" r:id="rId1"/>
   </p:sldMasterIdLst>
   <p:sldIdLst>
-    <p:sldId id="256" r:id="rId2"/>
-    <p:sldId id="257" r:id="rId3"/>
+    <p:sldId id="257" r:id="rId2"/>
+    <p:sldId id="256" r:id="rId3"/>
   </p:sldIdLst>
   <p:sldSz cx="12192000" cy="6858000"/>
   <p:notesSz cx="6858000" cy="9144000"/>
@@ -105,6 +105,11 @@
       </a:defRPr>
     </a:lvl9pPr>
   </p:defaultTextStyle>
+  <p:extLst>
+    <p:ext uri="{EFAFB233-063F-42B5-8137-9DF3F51BA10A}">
+      <p15:sldGuideLst xmlns:p15="http://schemas.microsoft.com/office/powerpoint/2012/main"/>
+    </p:ext>
+  </p:extLst>
 </p:presentation>
 </file>
 
@@ -239,7 +244,7 @@
           <a:p>
             <a:fld id="{F0453384-F5B2-430A-8660-52C468AD2336}" type="datetimeFigureOut">
               <a:rPr lang="en-US" smtClean="0"/>
-              <a:t>12/2/2018</a:t>
+              <a:t>12/10/2018</a:t>
             </a:fld>
             <a:endParaRPr lang="en-US"/>
           </a:p>
@@ -409,7 +414,7 @@
           <a:p>
             <a:fld id="{F0453384-F5B2-430A-8660-52C468AD2336}" type="datetimeFigureOut">
               <a:rPr lang="en-US" smtClean="0"/>
-              <a:t>12/2/2018</a:t>
+              <a:t>12/10/2018</a:t>
             </a:fld>
             <a:endParaRPr lang="en-US"/>
           </a:p>
@@ -589,7 +594,7 @@
           <a:p>
             <a:fld id="{F0453384-F5B2-430A-8660-52C468AD2336}" type="datetimeFigureOut">
               <a:rPr lang="en-US" smtClean="0"/>
-              <a:t>12/2/2018</a:t>
+              <a:t>12/10/2018</a:t>
             </a:fld>
             <a:endParaRPr lang="en-US"/>
           </a:p>
@@ -759,7 +764,7 @@
           <a:p>
             <a:fld id="{F0453384-F5B2-430A-8660-52C468AD2336}" type="datetimeFigureOut">
               <a:rPr lang="en-US" smtClean="0"/>
-              <a:t>12/2/2018</a:t>
+              <a:t>12/10/2018</a:t>
             </a:fld>
             <a:endParaRPr lang="en-US"/>
           </a:p>
@@ -1005,7 +1010,7 @@
           <a:p>
             <a:fld id="{F0453384-F5B2-430A-8660-52C468AD2336}" type="datetimeFigureOut">
               <a:rPr lang="en-US" smtClean="0"/>
-              <a:t>12/2/2018</a:t>
+              <a:t>12/10/2018</a:t>
             </a:fld>
             <a:endParaRPr lang="en-US"/>
           </a:p>
@@ -1237,7 +1242,7 @@
           <a:p>
             <a:fld id="{F0453384-F5B2-430A-8660-52C468AD2336}" type="datetimeFigureOut">
               <a:rPr lang="en-US" smtClean="0"/>
-              <a:t>12/2/2018</a:t>
+              <a:t>12/10/2018</a:t>
             </a:fld>
             <a:endParaRPr lang="en-US"/>
           </a:p>
@@ -1604,7 +1609,7 @@
           <a:p>
             <a:fld id="{F0453384-F5B2-430A-8660-52C468AD2336}" type="datetimeFigureOut">
               <a:rPr lang="en-US" smtClean="0"/>
-              <a:t>12/2/2018</a:t>
+              <a:t>12/10/2018</a:t>
             </a:fld>
             <a:endParaRPr lang="en-US"/>
           </a:p>
@@ -1722,7 +1727,7 @@
           <a:p>
             <a:fld id="{F0453384-F5B2-430A-8660-52C468AD2336}" type="datetimeFigureOut">
               <a:rPr lang="en-US" smtClean="0"/>
-              <a:t>12/2/2018</a:t>
+              <a:t>12/10/2018</a:t>
             </a:fld>
             <a:endParaRPr lang="en-US"/>
           </a:p>
@@ -1817,7 +1822,7 @@
           <a:p>
             <a:fld id="{F0453384-F5B2-430A-8660-52C468AD2336}" type="datetimeFigureOut">
               <a:rPr lang="en-US" smtClean="0"/>
-              <a:t>12/2/2018</a:t>
+              <a:t>12/10/2018</a:t>
             </a:fld>
             <a:endParaRPr lang="en-US"/>
           </a:p>
@@ -2094,7 +2099,7 @@
           <a:p>
             <a:fld id="{F0453384-F5B2-430A-8660-52C468AD2336}" type="datetimeFigureOut">
               <a:rPr lang="en-US" smtClean="0"/>
-              <a:t>12/2/2018</a:t>
+              <a:t>12/10/2018</a:t>
             </a:fld>
             <a:endParaRPr lang="en-US"/>
           </a:p>
@@ -2347,7 +2352,7 @@
           <a:p>
             <a:fld id="{F0453384-F5B2-430A-8660-52C468AD2336}" type="datetimeFigureOut">
               <a:rPr lang="en-US" smtClean="0"/>
-              <a:t>12/2/2018</a:t>
+              <a:t>12/10/2018</a:t>
             </a:fld>
             <a:endParaRPr lang="en-US"/>
           </a:p>
@@ -2560,7 +2565,7 @@
           <a:p>
             <a:fld id="{F0453384-F5B2-430A-8660-52C468AD2336}" type="datetimeFigureOut">
               <a:rPr lang="en-US" smtClean="0"/>
-              <a:t>12/2/2018</a:t>
+              <a:t>12/10/2018</a:t>
             </a:fld>
             <a:endParaRPr lang="en-US"/>
           </a:p>
@@ -3006,7 +3011,7 @@
     </p:spTree>
     <p:extLst>
       <p:ext uri="{BB962C8B-B14F-4D97-AF65-F5344CB8AC3E}">
-        <p14:creationId xmlns:p14="http://schemas.microsoft.com/office/powerpoint/2010/main" val="1421633511"/>
+        <p14:creationId xmlns:p14="http://schemas.microsoft.com/office/powerpoint/2010/main" val="2225287631"/>
       </p:ext>
     </p:extLst>
   </p:cSld>
@@ -3033,48 +3038,64 @@
           <a:chExt cx="0" cy="0"/>
         </a:xfrm>
       </p:grpSpPr>
-      <p:sp>
-        <p:nvSpPr>
-          <p:cNvPr id="2" name="Title 1"/>
-          <p:cNvSpPr>
-            <a:spLocks noGrp="1"/>
-          </p:cNvSpPr>
-          <p:nvPr>
-            <p:ph type="ctrTitle"/>
-          </p:nvPr>
-        </p:nvSpPr>
-        <p:spPr/>
-        <p:txBody>
-          <a:bodyPr/>
-          <a:lstStyle/>
-          <a:p>
-            <a:endParaRPr lang="en-US"/>
-          </a:p>
-        </p:txBody>
-      </p:sp>
-      <p:sp>
-        <p:nvSpPr>
-          <p:cNvPr id="3" name="Subtitle 2"/>
-          <p:cNvSpPr>
-            <a:spLocks noGrp="1"/>
-          </p:cNvSpPr>
-          <p:nvPr>
-            <p:ph type="subTitle" idx="1"/>
-          </p:nvPr>
-        </p:nvSpPr>
-        <p:spPr/>
-        <p:txBody>
-          <a:bodyPr/>
-          <a:lstStyle/>
-          <a:p>
-            <a:endParaRPr lang="en-US"/>
+      <p:pic>
+        <p:nvPicPr>
+          <p:cNvPr id="5" name="Picture 4"/>
+          <p:cNvPicPr>
+            <a:picLocks noChangeAspect="1"/>
+          </p:cNvPicPr>
+          <p:nvPr/>
+        </p:nvPicPr>
+        <p:blipFill>
+          <a:blip r:embed="rId2"/>
+          <a:stretch>
+            <a:fillRect/>
+          </a:stretch>
+        </p:blipFill>
+        <p:spPr>
+          <a:xfrm>
+            <a:off x="1399429" y="560567"/>
+            <a:ext cx="8487810" cy="5180294"/>
+          </a:xfrm>
+          <a:prstGeom prst="rect">
+            <a:avLst/>
+          </a:prstGeom>
+        </p:spPr>
+      </p:pic>
+      <p:sp>
+        <p:nvSpPr>
+          <p:cNvPr id="6" name="TextBox 5"/>
+          <p:cNvSpPr txBox="1"/>
+          <p:nvPr/>
+        </p:nvSpPr>
+        <p:spPr>
+          <a:xfrm>
+            <a:off x="803082" y="5836257"/>
+            <a:ext cx="10209474" cy="923330"/>
+          </a:xfrm>
+          <a:prstGeom prst="rect">
+            <a:avLst/>
+          </a:prstGeom>
+          <a:noFill/>
+        </p:spPr>
+        <p:txBody>
+          <a:bodyPr wrap="square" rtlCol="0">
+            <a:spAutoFit/>
+          </a:bodyPr>
+          <a:lstStyle/>
+          <a:p>
+            <a:r>
+              <a:rPr lang="pl-PL" dirty="0" smtClean="0"/>
+              <a:t>Wnioski: Po oczyszczeniu danych zauważono, że kraj o inicjałach ZZ posiada największą sumę wartości różnic kwoty oryginalnej a ostatecznej. Kraj ZZ w bazie jest wartością nieokreśloną. Może to sugerować niewłaściwe dane w bazie lub ich brak. Dokładniejsze wnioski zostaną określne w dalszej części prezentacji.</a:t>
+            </a:r>
+            <a:endParaRPr lang="en-US" dirty="0"/>
           </a:p>
         </p:txBody>
       </p:sp>
     </p:spTree>
     <p:extLst>
       <p:ext uri="{BB962C8B-B14F-4D97-AF65-F5344CB8AC3E}">
-        <p14:creationId xmlns:p14="http://schemas.microsoft.com/office/powerpoint/2010/main" val="2225287631"/>
+        <p14:creationId xmlns:p14="http://schemas.microsoft.com/office/powerpoint/2010/main" val="1421633511"/>
       </p:ext>
     </p:extLst>
   </p:cSld>

</xml_diff>

<commit_message>
slajd nr 5 w prezentacji / Mateusz
</commit_message>
<xml_diff>
--- a/Apacze_projekt.pptx
+++ b/Apacze_projekt.pptx
@@ -9,6 +9,7 @@
     <p:sldId id="258" r:id="rId3"/>
     <p:sldId id="256" r:id="rId4"/>
     <p:sldId id="259" r:id="rId5"/>
+    <p:sldId id="260" r:id="rId6"/>
   </p:sldIdLst>
   <p:sldSz cx="12192000" cy="6858000"/>
   <p:notesSz cx="6858000" cy="9144000"/>
@@ -244,7 +245,7 @@
           <a:p>
             <a:fld id="{F0453384-F5B2-430A-8660-52C468AD2336}" type="datetimeFigureOut">
               <a:rPr lang="en-US" smtClean="0"/>
-              <a:t>12/13/2018</a:t>
+              <a:t>12/28/2018</a:t>
             </a:fld>
             <a:endParaRPr lang="en-US"/>
           </a:p>
@@ -412,7 +413,7 @@
           <a:p>
             <a:fld id="{F0453384-F5B2-430A-8660-52C468AD2336}" type="datetimeFigureOut">
               <a:rPr lang="en-US" smtClean="0"/>
-              <a:t>12/13/2018</a:t>
+              <a:t>12/28/2018</a:t>
             </a:fld>
             <a:endParaRPr lang="en-US"/>
           </a:p>
@@ -590,7 +591,7 @@
           <a:p>
             <a:fld id="{F0453384-F5B2-430A-8660-52C468AD2336}" type="datetimeFigureOut">
               <a:rPr lang="en-US" smtClean="0"/>
-              <a:t>12/13/2018</a:t>
+              <a:t>12/28/2018</a:t>
             </a:fld>
             <a:endParaRPr lang="en-US"/>
           </a:p>
@@ -758,7 +759,7 @@
           <a:p>
             <a:fld id="{F0453384-F5B2-430A-8660-52C468AD2336}" type="datetimeFigureOut">
               <a:rPr lang="en-US" smtClean="0"/>
-              <a:t>12/13/2018</a:t>
+              <a:t>12/28/2018</a:t>
             </a:fld>
             <a:endParaRPr lang="en-US"/>
           </a:p>
@@ -1003,7 +1004,7 @@
           <a:p>
             <a:fld id="{F0453384-F5B2-430A-8660-52C468AD2336}" type="datetimeFigureOut">
               <a:rPr lang="en-US" smtClean="0"/>
-              <a:t>12/13/2018</a:t>
+              <a:t>12/28/2018</a:t>
             </a:fld>
             <a:endParaRPr lang="en-US"/>
           </a:p>
@@ -1232,7 +1233,7 @@
           <a:p>
             <a:fld id="{F0453384-F5B2-430A-8660-52C468AD2336}" type="datetimeFigureOut">
               <a:rPr lang="en-US" smtClean="0"/>
-              <a:t>12/13/2018</a:t>
+              <a:t>12/28/2018</a:t>
             </a:fld>
             <a:endParaRPr lang="en-US"/>
           </a:p>
@@ -1596,7 +1597,7 @@
           <a:p>
             <a:fld id="{F0453384-F5B2-430A-8660-52C468AD2336}" type="datetimeFigureOut">
               <a:rPr lang="en-US" smtClean="0"/>
-              <a:t>12/13/2018</a:t>
+              <a:t>12/28/2018</a:t>
             </a:fld>
             <a:endParaRPr lang="en-US"/>
           </a:p>
@@ -1713,7 +1714,7 @@
           <a:p>
             <a:fld id="{F0453384-F5B2-430A-8660-52C468AD2336}" type="datetimeFigureOut">
               <a:rPr lang="en-US" smtClean="0"/>
-              <a:t>12/13/2018</a:t>
+              <a:t>12/28/2018</a:t>
             </a:fld>
             <a:endParaRPr lang="en-US"/>
           </a:p>
@@ -1808,7 +1809,7 @@
           <a:p>
             <a:fld id="{F0453384-F5B2-430A-8660-52C468AD2336}" type="datetimeFigureOut">
               <a:rPr lang="en-US" smtClean="0"/>
-              <a:t>12/13/2018</a:t>
+              <a:t>12/28/2018</a:t>
             </a:fld>
             <a:endParaRPr lang="en-US"/>
           </a:p>
@@ -2083,7 +2084,7 @@
           <a:p>
             <a:fld id="{F0453384-F5B2-430A-8660-52C468AD2336}" type="datetimeFigureOut">
               <a:rPr lang="en-US" smtClean="0"/>
-              <a:t>12/13/2018</a:t>
+              <a:t>12/28/2018</a:t>
             </a:fld>
             <a:endParaRPr lang="en-US"/>
           </a:p>
@@ -2335,7 +2336,7 @@
           <a:p>
             <a:fld id="{F0453384-F5B2-430A-8660-52C468AD2336}" type="datetimeFigureOut">
               <a:rPr lang="en-US" smtClean="0"/>
-              <a:t>12/13/2018</a:t>
+              <a:t>12/28/2018</a:t>
             </a:fld>
             <a:endParaRPr lang="en-US"/>
           </a:p>
@@ -2546,7 +2547,7 @@
           <a:p>
             <a:fld id="{F0453384-F5B2-430A-8660-52C468AD2336}" type="datetimeFigureOut">
               <a:rPr lang="en-US" smtClean="0"/>
-              <a:t>12/13/2018</a:t>
+              <a:t>12/28/2018</a:t>
             </a:fld>
             <a:endParaRPr lang="en-US"/>
           </a:p>
@@ -3294,6 +3295,66 @@
 </p:sld>
 </file>
 
+<file path=ppt/slides/slide5.xml><?xml version="1.0" encoding="utf-8"?>
+<p:sld xmlns:a="http://schemas.openxmlformats.org/drawingml/2006/main" xmlns:r="http://schemas.openxmlformats.org/officeDocument/2006/relationships" xmlns:p="http://schemas.openxmlformats.org/presentationml/2006/main">
+  <p:cSld>
+    <p:spTree>
+      <p:nvGrpSpPr>
+        <p:cNvPr id="1" name=""/>
+        <p:cNvGrpSpPr/>
+        <p:nvPr/>
+      </p:nvGrpSpPr>
+      <p:grpSpPr>
+        <a:xfrm>
+          <a:off x="0" y="0"/>
+          <a:ext cx="0" cy="0"/>
+          <a:chOff x="0" y="0"/>
+          <a:chExt cx="0" cy="0"/>
+        </a:xfrm>
+      </p:grpSpPr>
+      <p:pic>
+        <p:nvPicPr>
+          <p:cNvPr id="4" name="Obraz 3"/>
+          <p:cNvPicPr>
+            <a:picLocks noChangeAspect="1"/>
+          </p:cNvPicPr>
+          <p:nvPr/>
+        </p:nvPicPr>
+        <p:blipFill>
+          <a:blip r:embed="rId2">
+            <a:extLst>
+              <a:ext uri="{28A0092B-C50C-407E-A947-70E740481C1C}">
+                <a14:useLocalDpi xmlns:a14="http://schemas.microsoft.com/office/drawing/2010/main" val="0"/>
+              </a:ext>
+            </a:extLst>
+          </a:blip>
+          <a:stretch>
+            <a:fillRect/>
+          </a:stretch>
+        </p:blipFill>
+        <p:spPr>
+          <a:xfrm>
+            <a:off x="0" y="132777"/>
+            <a:ext cx="12192000" cy="6592446"/>
+          </a:xfrm>
+          <a:prstGeom prst="rect">
+            <a:avLst/>
+          </a:prstGeom>
+        </p:spPr>
+      </p:pic>
+    </p:spTree>
+    <p:extLst>
+      <p:ext uri="{BB962C8B-B14F-4D97-AF65-F5344CB8AC3E}">
+        <p14:creationId xmlns:p14="http://schemas.microsoft.com/office/powerpoint/2010/main" val="10205664"/>
+      </p:ext>
+    </p:extLst>
+  </p:cSld>
+  <p:clrMapOvr>
+    <a:masterClrMapping/>
+  </p:clrMapOvr>
+</p:sld>
+</file>
+
 <file path=ppt/theme/theme1.xml><?xml version="1.0" encoding="utf-8"?>
 <a:theme xmlns:a="http://schemas.openxmlformats.org/drawingml/2006/main" name="Office Theme">
   <a:themeElements>

</xml_diff>

<commit_message>
zmiany w prezentacji, linki, dodatkowe wykresy
</commit_message>
<xml_diff>
--- a/Apacze_projekt.pptx
+++ b/Apacze_projekt.pptx
@@ -6,10 +6,17 @@
   </p:sldMasterIdLst>
   <p:sldIdLst>
     <p:sldId id="257" r:id="rId2"/>
-    <p:sldId id="258" r:id="rId3"/>
-    <p:sldId id="256" r:id="rId4"/>
-    <p:sldId id="259" r:id="rId5"/>
-    <p:sldId id="260" r:id="rId6"/>
+    <p:sldId id="261" r:id="rId3"/>
+    <p:sldId id="267" r:id="rId4"/>
+    <p:sldId id="262" r:id="rId5"/>
+    <p:sldId id="263" r:id="rId6"/>
+    <p:sldId id="264" r:id="rId7"/>
+    <p:sldId id="266" r:id="rId8"/>
+    <p:sldId id="265" r:id="rId9"/>
+    <p:sldId id="258" r:id="rId10"/>
+    <p:sldId id="256" r:id="rId11"/>
+    <p:sldId id="259" r:id="rId12"/>
+    <p:sldId id="260" r:id="rId13"/>
   </p:sldIdLst>
   <p:sldSz cx="12192000" cy="6858000"/>
   <p:notesSz cx="6858000" cy="9144000"/>
@@ -245,7 +252,7 @@
           <a:p>
             <a:fld id="{F0453384-F5B2-430A-8660-52C468AD2336}" type="datetimeFigureOut">
               <a:rPr lang="en-US" smtClean="0"/>
-              <a:t>12/28/2018</a:t>
+              <a:t>1/6/19</a:t>
             </a:fld>
             <a:endParaRPr lang="en-US"/>
           </a:p>
@@ -413,7 +420,7 @@
           <a:p>
             <a:fld id="{F0453384-F5B2-430A-8660-52C468AD2336}" type="datetimeFigureOut">
               <a:rPr lang="en-US" smtClean="0"/>
-              <a:t>12/28/2018</a:t>
+              <a:t>1/6/19</a:t>
             </a:fld>
             <a:endParaRPr lang="en-US"/>
           </a:p>
@@ -591,7 +598,7 @@
           <a:p>
             <a:fld id="{F0453384-F5B2-430A-8660-52C468AD2336}" type="datetimeFigureOut">
               <a:rPr lang="en-US" smtClean="0"/>
-              <a:t>12/28/2018</a:t>
+              <a:t>1/6/19</a:t>
             </a:fld>
             <a:endParaRPr lang="en-US"/>
           </a:p>
@@ -759,7 +766,7 @@
           <a:p>
             <a:fld id="{F0453384-F5B2-430A-8660-52C468AD2336}" type="datetimeFigureOut">
               <a:rPr lang="en-US" smtClean="0"/>
-              <a:t>12/28/2018</a:t>
+              <a:t>1/6/19</a:t>
             </a:fld>
             <a:endParaRPr lang="en-US"/>
           </a:p>
@@ -1004,7 +1011,7 @@
           <a:p>
             <a:fld id="{F0453384-F5B2-430A-8660-52C468AD2336}" type="datetimeFigureOut">
               <a:rPr lang="en-US" smtClean="0"/>
-              <a:t>12/28/2018</a:t>
+              <a:t>1/6/19</a:t>
             </a:fld>
             <a:endParaRPr lang="en-US"/>
           </a:p>
@@ -1233,7 +1240,7 @@
           <a:p>
             <a:fld id="{F0453384-F5B2-430A-8660-52C468AD2336}" type="datetimeFigureOut">
               <a:rPr lang="en-US" smtClean="0"/>
-              <a:t>12/28/2018</a:t>
+              <a:t>1/6/19</a:t>
             </a:fld>
             <a:endParaRPr lang="en-US"/>
           </a:p>
@@ -1597,7 +1604,7 @@
           <a:p>
             <a:fld id="{F0453384-F5B2-430A-8660-52C468AD2336}" type="datetimeFigureOut">
               <a:rPr lang="en-US" smtClean="0"/>
-              <a:t>12/28/2018</a:t>
+              <a:t>1/6/19</a:t>
             </a:fld>
             <a:endParaRPr lang="en-US"/>
           </a:p>
@@ -1714,7 +1721,7 @@
           <a:p>
             <a:fld id="{F0453384-F5B2-430A-8660-52C468AD2336}" type="datetimeFigureOut">
               <a:rPr lang="en-US" smtClean="0"/>
-              <a:t>12/28/2018</a:t>
+              <a:t>1/6/19</a:t>
             </a:fld>
             <a:endParaRPr lang="en-US"/>
           </a:p>
@@ -1809,7 +1816,7 @@
           <a:p>
             <a:fld id="{F0453384-F5B2-430A-8660-52C468AD2336}" type="datetimeFigureOut">
               <a:rPr lang="en-US" smtClean="0"/>
-              <a:t>12/28/2018</a:t>
+              <a:t>1/6/19</a:t>
             </a:fld>
             <a:endParaRPr lang="en-US"/>
           </a:p>
@@ -2084,7 +2091,7 @@
           <a:p>
             <a:fld id="{F0453384-F5B2-430A-8660-52C468AD2336}" type="datetimeFigureOut">
               <a:rPr lang="en-US" smtClean="0"/>
-              <a:t>12/28/2018</a:t>
+              <a:t>1/6/19</a:t>
             </a:fld>
             <a:endParaRPr lang="en-US"/>
           </a:p>
@@ -2336,7 +2343,7 @@
           <a:p>
             <a:fld id="{F0453384-F5B2-430A-8660-52C468AD2336}" type="datetimeFigureOut">
               <a:rPr lang="en-US" smtClean="0"/>
-              <a:t>12/28/2018</a:t>
+              <a:t>1/6/19</a:t>
             </a:fld>
             <a:endParaRPr lang="en-US"/>
           </a:p>
@@ -2547,7 +2554,7 @@
           <a:p>
             <a:fld id="{F0453384-F5B2-430A-8660-52C468AD2336}" type="datetimeFigureOut">
               <a:rPr lang="en-US" smtClean="0"/>
-              <a:t>12/28/2018</a:t>
+              <a:t>1/6/19</a:t>
             </a:fld>
             <a:endParaRPr lang="en-US"/>
           </a:p>
@@ -2967,7 +2974,7 @@
           <a:bodyPr/>
           <a:lstStyle/>
           <a:p>
-            <a:endParaRPr lang="en-US"/>
+            <a:endParaRPr lang="en-US" dirty="0"/>
           </a:p>
         </p:txBody>
       </p:sp>
@@ -3003,155 +3010,7 @@
 </p:sld>
 </file>
 
-<file path=ppt/slides/slide2.xml><?xml version="1.0" encoding="utf-8"?>
-<p:sld xmlns:a="http://schemas.openxmlformats.org/drawingml/2006/main" xmlns:r="http://schemas.openxmlformats.org/officeDocument/2006/relationships" xmlns:p="http://schemas.openxmlformats.org/presentationml/2006/main">
-  <p:cSld>
-    <p:spTree>
-      <p:nvGrpSpPr>
-        <p:cNvPr id="1" name=""/>
-        <p:cNvGrpSpPr/>
-        <p:nvPr/>
-      </p:nvGrpSpPr>
-      <p:grpSpPr>
-        <a:xfrm>
-          <a:off x="0" y="0"/>
-          <a:ext cx="0" cy="0"/>
-          <a:chOff x="0" y="0"/>
-          <a:chExt cx="0" cy="0"/>
-        </a:xfrm>
-      </p:grpSpPr>
-      <p:sp>
-        <p:nvSpPr>
-          <p:cNvPr id="2" name="Tytuł 1">
-            <a:extLst>
-              <a:ext uri="{FF2B5EF4-FFF2-40B4-BE49-F238E27FC236}">
-                <a16:creationId xmlns:a16="http://schemas.microsoft.com/office/drawing/2014/main" id="{7DC17F75-58DA-46BC-9E5F-BDEB29B42EC3}"/>
-              </a:ext>
-            </a:extLst>
-          </p:cNvPr>
-          <p:cNvSpPr>
-            <a:spLocks noGrp="1"/>
-          </p:cNvSpPr>
-          <p:nvPr>
-            <p:ph type="title"/>
-          </p:nvPr>
-        </p:nvSpPr>
-        <p:spPr>
-          <a:xfrm>
-            <a:off x="839788" y="457200"/>
-            <a:ext cx="3932237" cy="395056"/>
-          </a:xfrm>
-        </p:spPr>
-        <p:txBody>
-          <a:bodyPr>
-            <a:normAutofit/>
-          </a:bodyPr>
-          <a:lstStyle/>
-          <a:p>
-            <a:pPr algn="ctr"/>
-            <a:r>
-              <a:rPr lang="pl-PL" sz="1600" b="1" dirty="0"/>
-              <a:t>Analiza różnic z uwagi na rok wypłacenia.</a:t>
-            </a:r>
-          </a:p>
-        </p:txBody>
-      </p:sp>
-      <p:pic>
-        <p:nvPicPr>
-          <p:cNvPr id="5" name="Symbol zastępczy obrazu 4">
-            <a:extLst>
-              <a:ext uri="{FF2B5EF4-FFF2-40B4-BE49-F238E27FC236}">
-                <a16:creationId xmlns:a16="http://schemas.microsoft.com/office/drawing/2014/main" id="{85158475-A68D-4152-B537-D497AF148565}"/>
-              </a:ext>
-            </a:extLst>
-          </p:cNvPr>
-          <p:cNvPicPr>
-            <a:picLocks noGrp="1" noChangeAspect="1"/>
-          </p:cNvPicPr>
-          <p:nvPr>
-            <p:ph type="pic" idx="1"/>
-          </p:nvPr>
-        </p:nvPicPr>
-        <p:blipFill rotWithShape="1">
-          <a:blip r:embed="rId2"/>
-          <a:srcRect l="14382" r="23420" b="3734"/>
-          <a:stretch/>
-        </p:blipFill>
-        <p:spPr>
-          <a:xfrm>
-            <a:off x="4772026" y="0"/>
-            <a:ext cx="7419974" cy="6858001"/>
-          </a:xfrm>
-          <a:prstGeom prst="rect">
-            <a:avLst/>
-          </a:prstGeom>
-        </p:spPr>
-      </p:pic>
-      <p:sp>
-        <p:nvSpPr>
-          <p:cNvPr id="4" name="Symbol zastępczy tekstu 3">
-            <a:extLst>
-              <a:ext uri="{FF2B5EF4-FFF2-40B4-BE49-F238E27FC236}">
-                <a16:creationId xmlns:a16="http://schemas.microsoft.com/office/drawing/2014/main" id="{AE242361-A21D-4C64-B6C6-B19BDB064116}"/>
-              </a:ext>
-            </a:extLst>
-          </p:cNvPr>
-          <p:cNvSpPr>
-            <a:spLocks noGrp="1"/>
-          </p:cNvSpPr>
-          <p:nvPr>
-            <p:ph type="body" sz="half" idx="2"/>
-          </p:nvPr>
-        </p:nvSpPr>
-        <p:spPr>
-          <a:xfrm>
-            <a:off x="839788" y="1127464"/>
-            <a:ext cx="3932237" cy="4741524"/>
-          </a:xfrm>
-        </p:spPr>
-        <p:txBody>
-          <a:bodyPr/>
-          <a:lstStyle/>
-          <a:p>
-            <a:pPr algn="just"/>
-            <a:r>
-              <a:rPr lang="pl-PL" dirty="0"/>
-              <a:t>Suma różnic pomiędzy rekompensatami wnioskowanymi, a wypłaconymi, rosła równolegle do liczby wniosków.  Wzrost tych wartości następował z każdym kolejnym rokiem (dane z 2018 r. obejmują tylko początek roku). Nie stwierdziliśmy, żeby któryś rok wyróżniał się na tle lat pozostałych.</a:t>
-            </a:r>
-          </a:p>
-          <a:p>
-            <a:pPr algn="just"/>
-            <a:r>
-              <a:rPr lang="pl-PL" dirty="0"/>
-              <a:t>Średnie różnice wnioskowanych wypłaconych kwot również nie odbiegały od siebie </a:t>
-            </a:r>
-            <a:br>
-              <a:rPr lang="pl-PL" dirty="0"/>
-            </a:br>
-            <a:r>
-              <a:rPr lang="pl-PL" dirty="0"/>
-              <a:t>w badanych latach. Wskazane najwyższe kwoty różnic były przypadkami wyjątkowymi, które nie miały jednak wpływu na całość danych. </a:t>
-            </a:r>
-          </a:p>
-          <a:p>
-            <a:endParaRPr lang="pl-PL" dirty="0"/>
-          </a:p>
-        </p:txBody>
-      </p:sp>
-    </p:spTree>
-    <p:extLst>
-      <p:ext uri="{BB962C8B-B14F-4D97-AF65-F5344CB8AC3E}">
-        <p14:creationId xmlns:p14="http://schemas.microsoft.com/office/powerpoint/2010/main" val="1418438960"/>
-      </p:ext>
-    </p:extLst>
-  </p:cSld>
-  <p:clrMapOvr>
-    <a:masterClrMapping/>
-  </p:clrMapOvr>
-</p:sld>
-</file>
-
-<file path=ppt/slides/slide3.xml><?xml version="1.0" encoding="utf-8"?>
+<file path=ppt/slides/slide10.xml><?xml version="1.0" encoding="utf-8"?>
 <p:sld xmlns:a="http://schemas.openxmlformats.org/drawingml/2006/main" xmlns:r="http://schemas.openxmlformats.org/officeDocument/2006/relationships" xmlns:p="http://schemas.openxmlformats.org/presentationml/2006/main">
   <p:cSld>
     <p:spTree>
@@ -3235,7 +3094,7 @@
 </p:sld>
 </file>
 
-<file path=ppt/slides/slide4.xml><?xml version="1.0" encoding="utf-8"?>
+<file path=ppt/slides/slide11.xml><?xml version="1.0" encoding="utf-8"?>
 <p:sld xmlns:a="http://schemas.openxmlformats.org/drawingml/2006/main" xmlns:r="http://schemas.openxmlformats.org/officeDocument/2006/relationships" xmlns:p="http://schemas.openxmlformats.org/presentationml/2006/main">
   <p:cSld>
     <p:spTree>
@@ -3295,7 +3154,7 @@
 </p:sld>
 </file>
 
-<file path=ppt/slides/slide5.xml><?xml version="1.0" encoding="utf-8"?>
+<file path=ppt/slides/slide12.xml><?xml version="1.0" encoding="utf-8"?>
 <p:sld xmlns:a="http://schemas.openxmlformats.org/drawingml/2006/main" xmlns:r="http://schemas.openxmlformats.org/officeDocument/2006/relationships" xmlns:p="http://schemas.openxmlformats.org/presentationml/2006/main">
   <p:cSld>
     <p:spTree>
@@ -3346,6 +3205,1339 @@
     <p:extLst>
       <p:ext uri="{BB962C8B-B14F-4D97-AF65-F5344CB8AC3E}">
         <p14:creationId xmlns:p14="http://schemas.microsoft.com/office/powerpoint/2010/main" val="10205664"/>
+      </p:ext>
+    </p:extLst>
+  </p:cSld>
+  <p:clrMapOvr>
+    <a:masterClrMapping/>
+  </p:clrMapOvr>
+</p:sld>
+</file>
+
+<file path=ppt/slides/slide2.xml><?xml version="1.0" encoding="utf-8"?>
+<p:sld xmlns:a="http://schemas.openxmlformats.org/drawingml/2006/main" xmlns:r="http://schemas.openxmlformats.org/officeDocument/2006/relationships" xmlns:p="http://schemas.openxmlformats.org/presentationml/2006/main">
+  <p:cSld>
+    <p:spTree>
+      <p:nvGrpSpPr>
+        <p:cNvPr id="1" name=""/>
+        <p:cNvGrpSpPr/>
+        <p:nvPr/>
+      </p:nvGrpSpPr>
+      <p:grpSpPr>
+        <a:xfrm>
+          <a:off x="0" y="0"/>
+          <a:ext cx="0" cy="0"/>
+          <a:chOff x="0" y="0"/>
+          <a:chExt cx="0" cy="0"/>
+        </a:xfrm>
+      </p:grpSpPr>
+      <p:sp>
+        <p:nvSpPr>
+          <p:cNvPr id="2" name="Tytuł 1">
+            <a:extLst>
+              <a:ext uri="{FF2B5EF4-FFF2-40B4-BE49-F238E27FC236}">
+                <a16:creationId xmlns:a16="http://schemas.microsoft.com/office/drawing/2014/main" id="{018B1971-A0A8-6340-98FB-87D507A666C7}"/>
+              </a:ext>
+            </a:extLst>
+          </p:cNvPr>
+          <p:cNvSpPr>
+            <a:spLocks noGrp="1"/>
+          </p:cNvSpPr>
+          <p:nvPr>
+            <p:ph type="title"/>
+          </p:nvPr>
+        </p:nvSpPr>
+        <p:spPr/>
+        <p:txBody>
+          <a:bodyPr/>
+          <a:lstStyle/>
+          <a:p>
+            <a:r>
+              <a:rPr lang="pl-PL" dirty="0"/>
+              <a:t>Zespół projektowy Apacze</a:t>
+            </a:r>
+          </a:p>
+        </p:txBody>
+      </p:sp>
+      <p:sp>
+        <p:nvSpPr>
+          <p:cNvPr id="3" name="Symbol zastępczy zawartości 2">
+            <a:extLst>
+              <a:ext uri="{FF2B5EF4-FFF2-40B4-BE49-F238E27FC236}">
+                <a16:creationId xmlns:a16="http://schemas.microsoft.com/office/drawing/2014/main" id="{4C80CF59-9F93-844C-8A82-2AF3F6DA500A}"/>
+              </a:ext>
+            </a:extLst>
+          </p:cNvPr>
+          <p:cNvSpPr>
+            <a:spLocks noGrp="1"/>
+          </p:cNvSpPr>
+          <p:nvPr>
+            <p:ph idx="1"/>
+          </p:nvPr>
+        </p:nvSpPr>
+        <p:spPr/>
+        <p:txBody>
+          <a:bodyPr/>
+          <a:lstStyle/>
+          <a:p>
+            <a:pPr lvl="1"/>
+            <a:r>
+              <a:rPr lang="pl-PL" b="1" dirty="0"/>
+              <a:t>LILIANA </a:t>
+            </a:r>
+          </a:p>
+          <a:p>
+            <a:pPr lvl="1"/>
+            <a:r>
+              <a:rPr lang="pl-PL" b="1" dirty="0"/>
+              <a:t>JAKUB F. </a:t>
+            </a:r>
+          </a:p>
+          <a:p>
+            <a:pPr lvl="1"/>
+            <a:r>
+              <a:rPr lang="pl-PL" b="1" dirty="0"/>
+              <a:t>MICHAŁ K. </a:t>
+            </a:r>
+          </a:p>
+          <a:p>
+            <a:pPr lvl="1"/>
+            <a:r>
+              <a:rPr lang="pl-PL" b="1" dirty="0"/>
+              <a:t>MATEUSZ </a:t>
+            </a:r>
+          </a:p>
+          <a:p>
+            <a:endParaRPr lang="pl-PL" dirty="0"/>
+          </a:p>
+        </p:txBody>
+      </p:sp>
+    </p:spTree>
+    <p:extLst>
+      <p:ext uri="{BB962C8B-B14F-4D97-AF65-F5344CB8AC3E}">
+        <p14:creationId xmlns:p14="http://schemas.microsoft.com/office/powerpoint/2010/main" val="1273144048"/>
+      </p:ext>
+    </p:extLst>
+  </p:cSld>
+  <p:clrMapOvr>
+    <a:masterClrMapping/>
+  </p:clrMapOvr>
+</p:sld>
+</file>
+
+<file path=ppt/slides/slide3.xml><?xml version="1.0" encoding="utf-8"?>
+<p:sld xmlns:a="http://schemas.openxmlformats.org/drawingml/2006/main" xmlns:r="http://schemas.openxmlformats.org/officeDocument/2006/relationships" xmlns:p="http://schemas.openxmlformats.org/presentationml/2006/main">
+  <p:cSld>
+    <p:spTree>
+      <p:nvGrpSpPr>
+        <p:cNvPr id="1" name=""/>
+        <p:cNvGrpSpPr/>
+        <p:nvPr/>
+      </p:nvGrpSpPr>
+      <p:grpSpPr>
+        <a:xfrm>
+          <a:off x="0" y="0"/>
+          <a:ext cx="0" cy="0"/>
+          <a:chOff x="0" y="0"/>
+          <a:chExt cx="0" cy="0"/>
+        </a:xfrm>
+      </p:grpSpPr>
+      <p:sp>
+        <p:nvSpPr>
+          <p:cNvPr id="2" name="Tytuł 1">
+            <a:extLst>
+              <a:ext uri="{FF2B5EF4-FFF2-40B4-BE49-F238E27FC236}">
+                <a16:creationId xmlns:a16="http://schemas.microsoft.com/office/drawing/2014/main" id="{D097C2AC-DAE8-044C-BF84-0FE4D5CCC7FD}"/>
+              </a:ext>
+            </a:extLst>
+          </p:cNvPr>
+          <p:cNvSpPr>
+            <a:spLocks noGrp="1"/>
+          </p:cNvSpPr>
+          <p:nvPr>
+            <p:ph type="title"/>
+          </p:nvPr>
+        </p:nvSpPr>
+        <p:spPr/>
+        <p:txBody>
+          <a:bodyPr/>
+          <a:lstStyle/>
+          <a:p>
+            <a:r>
+              <a:rPr lang="pl-PL" dirty="0"/>
+              <a:t>TWORZYMY TABLEAU DATA STORY	</a:t>
+            </a:r>
+          </a:p>
+        </p:txBody>
+      </p:sp>
+      <p:sp>
+        <p:nvSpPr>
+          <p:cNvPr id="3" name="Symbol zastępczy zawartości 2">
+            <a:extLst>
+              <a:ext uri="{FF2B5EF4-FFF2-40B4-BE49-F238E27FC236}">
+                <a16:creationId xmlns:a16="http://schemas.microsoft.com/office/drawing/2014/main" id="{81F2C996-01A0-EB4B-9A96-D614656F8DE0}"/>
+              </a:ext>
+            </a:extLst>
+          </p:cNvPr>
+          <p:cNvSpPr>
+            <a:spLocks noGrp="1"/>
+          </p:cNvSpPr>
+          <p:nvPr>
+            <p:ph idx="1"/>
+          </p:nvPr>
+        </p:nvSpPr>
+        <p:spPr/>
+        <p:txBody>
+          <a:bodyPr/>
+          <a:lstStyle/>
+          <a:p>
+            <a:r>
+              <a:rPr lang="pl-PL" dirty="0"/>
+              <a:t>Login Tableau Public </a:t>
+            </a:r>
+            <a:r>
+              <a:rPr lang="pl-PL" dirty="0">
+                <a:hlinkClick r:id="rId2"/>
+              </a:rPr>
+              <a:t>apacze2019@gmail.com</a:t>
+            </a:r>
+            <a:r>
+              <a:rPr lang="pl-PL" dirty="0"/>
+              <a:t> </a:t>
+            </a:r>
+            <a:r>
+              <a:rPr lang="pl-PL" dirty="0" err="1"/>
+              <a:t>haslo</a:t>
+            </a:r>
+            <a:r>
+              <a:rPr lang="pl-PL" dirty="0"/>
+              <a:t>: apacze2019!</a:t>
+            </a:r>
+          </a:p>
+          <a:p>
+            <a:r>
+              <a:rPr lang="pl-PL" dirty="0" err="1"/>
+              <a:t>Haslo</a:t>
+            </a:r>
+            <a:r>
+              <a:rPr lang="pl-PL" dirty="0"/>
+              <a:t> do maila: </a:t>
+            </a:r>
+            <a:r>
+              <a:rPr lang="pl-PL" dirty="0">
+                <a:hlinkClick r:id="rId2"/>
+              </a:rPr>
+              <a:t>apacze2019@gmail.com</a:t>
+            </a:r>
+            <a:r>
+              <a:rPr lang="pl-PL" dirty="0"/>
+              <a:t> </a:t>
+            </a:r>
+            <a:r>
+              <a:rPr lang="pl-PL" dirty="0" err="1"/>
+              <a:t>haslo</a:t>
+            </a:r>
+            <a:r>
+              <a:rPr lang="pl-PL" dirty="0"/>
+              <a:t>: apacze2019</a:t>
+            </a:r>
+          </a:p>
+          <a:p>
+            <a:endParaRPr lang="pl-PL" dirty="0"/>
+          </a:p>
+        </p:txBody>
+      </p:sp>
+    </p:spTree>
+    <p:extLst>
+      <p:ext uri="{BB962C8B-B14F-4D97-AF65-F5344CB8AC3E}">
+        <p14:creationId xmlns:p14="http://schemas.microsoft.com/office/powerpoint/2010/main" val="1271194880"/>
+      </p:ext>
+    </p:extLst>
+  </p:cSld>
+  <p:clrMapOvr>
+    <a:masterClrMapping/>
+  </p:clrMapOvr>
+</p:sld>
+</file>
+
+<file path=ppt/slides/slide4.xml><?xml version="1.0" encoding="utf-8"?>
+<p:sld xmlns:a="http://schemas.openxmlformats.org/drawingml/2006/main" xmlns:r="http://schemas.openxmlformats.org/officeDocument/2006/relationships" xmlns:p="http://schemas.openxmlformats.org/presentationml/2006/main">
+  <p:cSld>
+    <p:spTree>
+      <p:nvGrpSpPr>
+        <p:cNvPr id="1" name=""/>
+        <p:cNvGrpSpPr/>
+        <p:nvPr/>
+      </p:nvGrpSpPr>
+      <p:grpSpPr>
+        <a:xfrm>
+          <a:off x="0" y="0"/>
+          <a:ext cx="0" cy="0"/>
+          <a:chOff x="0" y="0"/>
+          <a:chExt cx="0" cy="0"/>
+        </a:xfrm>
+      </p:grpSpPr>
+      <p:sp>
+        <p:nvSpPr>
+          <p:cNvPr id="2" name="Tytuł 1">
+            <a:extLst>
+              <a:ext uri="{FF2B5EF4-FFF2-40B4-BE49-F238E27FC236}">
+                <a16:creationId xmlns:a16="http://schemas.microsoft.com/office/drawing/2014/main" id="{1042B48D-DC93-394D-B119-D47E6582B116}"/>
+              </a:ext>
+            </a:extLst>
+          </p:cNvPr>
+          <p:cNvSpPr>
+            <a:spLocks noGrp="1"/>
+          </p:cNvSpPr>
+          <p:nvPr>
+            <p:ph type="title"/>
+          </p:nvPr>
+        </p:nvSpPr>
+        <p:spPr/>
+        <p:txBody>
+          <a:bodyPr/>
+          <a:lstStyle/>
+          <a:p>
+            <a:r>
+              <a:rPr lang="pl-PL" dirty="0"/>
+              <a:t>****Definicja problemu</a:t>
+            </a:r>
+          </a:p>
+        </p:txBody>
+      </p:sp>
+      <p:sp>
+        <p:nvSpPr>
+          <p:cNvPr id="3" name="Symbol zastępczy zawartości 2">
+            <a:extLst>
+              <a:ext uri="{FF2B5EF4-FFF2-40B4-BE49-F238E27FC236}">
+                <a16:creationId xmlns:a16="http://schemas.microsoft.com/office/drawing/2014/main" id="{5B3ADD29-8DA3-D04E-804C-38F06602821E}"/>
+              </a:ext>
+            </a:extLst>
+          </p:cNvPr>
+          <p:cNvSpPr>
+            <a:spLocks noGrp="1"/>
+          </p:cNvSpPr>
+          <p:nvPr>
+            <p:ph idx="1"/>
+          </p:nvPr>
+        </p:nvSpPr>
+        <p:spPr/>
+        <p:txBody>
+          <a:bodyPr/>
+          <a:lstStyle/>
+          <a:p>
+            <a:r>
+              <a:rPr lang="pl-PL" dirty="0"/>
+              <a:t>Przygotowanie 10-20 raportów informacyjnych na podstawie informacji Business </a:t>
+            </a:r>
+            <a:r>
+              <a:rPr lang="pl-PL" dirty="0" err="1"/>
+              <a:t>Ownera</a:t>
+            </a:r>
+            <a:endParaRPr lang="pl-PL" dirty="0"/>
+          </a:p>
+          <a:p>
+            <a:r>
+              <a:rPr lang="pl-PL" dirty="0"/>
+              <a:t>Przygotowanie 3-10 raportów informacyjnych na podstawie informacji Business </a:t>
+            </a:r>
+            <a:r>
+              <a:rPr lang="pl-PL" dirty="0" err="1"/>
+              <a:t>Ownera</a:t>
+            </a:r>
+            <a:endParaRPr lang="pl-PL" dirty="0"/>
+          </a:p>
+          <a:p>
+            <a:r>
+              <a:rPr lang="pl-PL" dirty="0"/>
+              <a:t>Analiza wyników uzyskanych w raportach</a:t>
+            </a:r>
+          </a:p>
+          <a:p>
+            <a:r>
+              <a:rPr lang="pl-PL" dirty="0"/>
+              <a:t>Prezentacja metryk przed trenerami akademii</a:t>
+            </a:r>
+          </a:p>
+          <a:p>
+            <a:r>
+              <a:rPr lang="pl-PL" dirty="0"/>
+              <a:t>Przygotowanie zestawu spostrzeżeń (</a:t>
+            </a:r>
+            <a:r>
+              <a:rPr lang="pl-PL" dirty="0" err="1"/>
+              <a:t>insights</a:t>
+            </a:r>
+            <a:r>
+              <a:rPr lang="pl-PL" dirty="0"/>
+              <a:t>) kluczowych do podjęcia właściwej decyzji biznesowej</a:t>
+            </a:r>
+          </a:p>
+        </p:txBody>
+      </p:sp>
+    </p:spTree>
+    <p:extLst>
+      <p:ext uri="{BB962C8B-B14F-4D97-AF65-F5344CB8AC3E}">
+        <p14:creationId xmlns:p14="http://schemas.microsoft.com/office/powerpoint/2010/main" val="3192928005"/>
+      </p:ext>
+    </p:extLst>
+  </p:cSld>
+  <p:clrMapOvr>
+    <a:masterClrMapping/>
+  </p:clrMapOvr>
+</p:sld>
+</file>
+
+<file path=ppt/slides/slide5.xml><?xml version="1.0" encoding="utf-8"?>
+<p:sld xmlns:a="http://schemas.openxmlformats.org/drawingml/2006/main" xmlns:r="http://schemas.openxmlformats.org/officeDocument/2006/relationships" xmlns:p="http://schemas.openxmlformats.org/presentationml/2006/main">
+  <p:cSld>
+    <p:spTree>
+      <p:nvGrpSpPr>
+        <p:cNvPr id="1" name=""/>
+        <p:cNvGrpSpPr/>
+        <p:nvPr/>
+      </p:nvGrpSpPr>
+      <p:grpSpPr>
+        <a:xfrm>
+          <a:off x="0" y="0"/>
+          <a:ext cx="0" cy="0"/>
+          <a:chOff x="0" y="0"/>
+          <a:chExt cx="0" cy="0"/>
+        </a:xfrm>
+      </p:grpSpPr>
+      <p:sp>
+        <p:nvSpPr>
+          <p:cNvPr id="2" name="Tytuł 1">
+            <a:extLst>
+              <a:ext uri="{FF2B5EF4-FFF2-40B4-BE49-F238E27FC236}">
+                <a16:creationId xmlns:a16="http://schemas.microsoft.com/office/drawing/2014/main" id="{FEF53BAD-D565-3F4F-B726-81C938C7617C}"/>
+              </a:ext>
+            </a:extLst>
+          </p:cNvPr>
+          <p:cNvSpPr>
+            <a:spLocks noGrp="1"/>
+          </p:cNvSpPr>
+          <p:nvPr>
+            <p:ph type="title"/>
+          </p:nvPr>
+        </p:nvSpPr>
+        <p:spPr/>
+        <p:txBody>
+          <a:bodyPr/>
+          <a:lstStyle/>
+          <a:p>
+            <a:r>
+              <a:rPr lang="pl-PL" dirty="0"/>
+              <a:t>TEMAT PROJEKTU	</a:t>
+            </a:r>
+          </a:p>
+        </p:txBody>
+      </p:sp>
+      <p:sp>
+        <p:nvSpPr>
+          <p:cNvPr id="3" name="Symbol zastępczy zawartości 2">
+            <a:extLst>
+              <a:ext uri="{FF2B5EF4-FFF2-40B4-BE49-F238E27FC236}">
+                <a16:creationId xmlns:a16="http://schemas.microsoft.com/office/drawing/2014/main" id="{1A92E088-D22E-5B4A-B345-8F43F320F7CA}"/>
+              </a:ext>
+            </a:extLst>
+          </p:cNvPr>
+          <p:cNvSpPr>
+            <a:spLocks noGrp="1"/>
+          </p:cNvSpPr>
+          <p:nvPr>
+            <p:ph idx="1"/>
+          </p:nvPr>
+        </p:nvSpPr>
+        <p:spPr/>
+        <p:txBody>
+          <a:bodyPr/>
+          <a:lstStyle/>
+          <a:p>
+            <a:pPr marL="0" indent="0">
+              <a:buNone/>
+            </a:pPr>
+            <a:r>
+              <a:rPr lang="pl-PL" dirty="0"/>
+              <a:t>Z czego wynikają wysokie różnice w rekompensatach oryginalnych i wnioskowanych?</a:t>
+            </a:r>
+          </a:p>
+        </p:txBody>
+      </p:sp>
+    </p:spTree>
+    <p:extLst>
+      <p:ext uri="{BB962C8B-B14F-4D97-AF65-F5344CB8AC3E}">
+        <p14:creationId xmlns:p14="http://schemas.microsoft.com/office/powerpoint/2010/main" val="2314204548"/>
+      </p:ext>
+    </p:extLst>
+  </p:cSld>
+  <p:clrMapOvr>
+    <a:masterClrMapping/>
+  </p:clrMapOvr>
+</p:sld>
+</file>
+
+<file path=ppt/slides/slide6.xml><?xml version="1.0" encoding="utf-8"?>
+<p:sld xmlns:a="http://schemas.openxmlformats.org/drawingml/2006/main" xmlns:r="http://schemas.openxmlformats.org/officeDocument/2006/relationships" xmlns:p="http://schemas.openxmlformats.org/presentationml/2006/main">
+  <p:cSld>
+    <p:spTree>
+      <p:nvGrpSpPr>
+        <p:cNvPr id="1" name=""/>
+        <p:cNvGrpSpPr/>
+        <p:nvPr/>
+      </p:nvGrpSpPr>
+      <p:grpSpPr>
+        <a:xfrm>
+          <a:off x="0" y="0"/>
+          <a:ext cx="0" cy="0"/>
+          <a:chOff x="0" y="0"/>
+          <a:chExt cx="0" cy="0"/>
+        </a:xfrm>
+      </p:grpSpPr>
+      <p:sp>
+        <p:nvSpPr>
+          <p:cNvPr id="2" name="Tytuł 1">
+            <a:extLst>
+              <a:ext uri="{FF2B5EF4-FFF2-40B4-BE49-F238E27FC236}">
+                <a16:creationId xmlns:a16="http://schemas.microsoft.com/office/drawing/2014/main" id="{0A48BB8F-C7E3-F849-AB3F-49350BAEE71E}"/>
+              </a:ext>
+            </a:extLst>
+          </p:cNvPr>
+          <p:cNvSpPr>
+            <a:spLocks noGrp="1"/>
+          </p:cNvSpPr>
+          <p:nvPr>
+            <p:ph type="title"/>
+          </p:nvPr>
+        </p:nvSpPr>
+        <p:spPr/>
+        <p:txBody>
+          <a:bodyPr/>
+          <a:lstStyle/>
+          <a:p>
+            <a:r>
+              <a:rPr lang="pl-PL" dirty="0"/>
+              <a:t>Definicja analizowanego zbioru wniosków o wysokich różnicach rekompensat</a:t>
+            </a:r>
+          </a:p>
+        </p:txBody>
+      </p:sp>
+      <p:sp>
+        <p:nvSpPr>
+          <p:cNvPr id="3" name="Symbol zastępczy zawartości 2">
+            <a:extLst>
+              <a:ext uri="{FF2B5EF4-FFF2-40B4-BE49-F238E27FC236}">
+                <a16:creationId xmlns:a16="http://schemas.microsoft.com/office/drawing/2014/main" id="{C0F47566-1091-334A-87DD-4CEE99152E56}"/>
+              </a:ext>
+            </a:extLst>
+          </p:cNvPr>
+          <p:cNvSpPr>
+            <a:spLocks noGrp="1"/>
+          </p:cNvSpPr>
+          <p:nvPr>
+            <p:ph idx="1"/>
+          </p:nvPr>
+        </p:nvSpPr>
+        <p:spPr/>
+        <p:txBody>
+          <a:bodyPr>
+            <a:normAutofit fontScale="62500" lnSpcReduction="20000"/>
+          </a:bodyPr>
+          <a:lstStyle/>
+          <a:p>
+            <a:pPr marL="514350" indent="-514350">
+              <a:buAutoNum type="arabicPeriod"/>
+            </a:pPr>
+            <a:r>
+              <a:rPr lang="pl-PL" dirty="0"/>
+              <a:t>Top 10 największych różnic nominalnych </a:t>
+            </a:r>
+          </a:p>
+          <a:p>
+            <a:pPr marL="0" indent="0">
+              <a:buNone/>
+            </a:pPr>
+            <a:r>
+              <a:rPr lang="pl-PL" dirty="0"/>
+              <a:t>Wykres 1.1. Sprawdzenie 50 największych </a:t>
+            </a:r>
+            <a:r>
+              <a:rPr lang="pl-PL" dirty="0" err="1"/>
+              <a:t>róznic</a:t>
+            </a:r>
+            <a:r>
+              <a:rPr lang="pl-PL" dirty="0"/>
+              <a:t> pomiędzy kwotami wnioskowanymi, a wypłaconymi</a:t>
+            </a:r>
+          </a:p>
+          <a:p>
+            <a:pPr marL="0" indent="0">
+              <a:buNone/>
+            </a:pPr>
+            <a:r>
+              <a:rPr lang="pl-PL" dirty="0"/>
+              <a:t>Wniosek: -- Kwota </a:t>
+            </a:r>
+            <a:r>
+              <a:rPr lang="pl-PL" dirty="0" err="1"/>
+              <a:t>ronic</a:t>
+            </a:r>
+            <a:r>
+              <a:rPr lang="pl-PL" dirty="0"/>
+              <a:t> w przedziale od 3.000,00 do 600,00 euro.</a:t>
+            </a:r>
+          </a:p>
+          <a:p>
+            <a:pPr marL="0" indent="0">
+              <a:buNone/>
+            </a:pPr>
+            <a:r>
+              <a:rPr lang="pl-PL" dirty="0"/>
+              <a:t>1.2 -- 50 </a:t>
+            </a:r>
+            <a:r>
+              <a:rPr lang="pl-PL" dirty="0" err="1"/>
+              <a:t>najwiekszych</a:t>
+            </a:r>
+            <a:r>
+              <a:rPr lang="pl-PL" dirty="0"/>
+              <a:t> </a:t>
+            </a:r>
+            <a:r>
+              <a:rPr lang="pl-PL" dirty="0" err="1"/>
+              <a:t>roznic</a:t>
+            </a:r>
+            <a:r>
+              <a:rPr lang="pl-PL" dirty="0"/>
+              <a:t> z </a:t>
+            </a:r>
+            <a:r>
+              <a:rPr lang="pl-PL" dirty="0" err="1"/>
+              <a:t>pomiedzy</a:t>
+            </a:r>
+            <a:r>
+              <a:rPr lang="pl-PL" dirty="0"/>
+              <a:t> kwotami wnioskowanymi, a </a:t>
+            </a:r>
+            <a:r>
+              <a:rPr lang="pl-PL" dirty="0" err="1"/>
+              <a:t>wyplaconymi</a:t>
+            </a:r>
+            <a:r>
+              <a:rPr lang="pl-PL" dirty="0"/>
+              <a:t>. </a:t>
+            </a:r>
+          </a:p>
+          <a:p>
+            <a:pPr marL="0" indent="0">
+              <a:buNone/>
+            </a:pPr>
+            <a:r>
+              <a:rPr lang="pl-PL" dirty="0"/>
+              <a:t>	a) geograficznie po kraju wnioskodawcy. Wniosek: Z 50 </a:t>
+            </a:r>
+            <a:r>
+              <a:rPr lang="pl-PL" dirty="0" err="1"/>
+              <a:t>wniosk�w</a:t>
+            </a:r>
+            <a:r>
+              <a:rPr lang="pl-PL" dirty="0"/>
+              <a:t> z </a:t>
+            </a:r>
+            <a:r>
+              <a:rPr lang="pl-PL" dirty="0" err="1"/>
+              <a:t>najwyekszych</a:t>
+            </a:r>
+            <a:r>
+              <a:rPr lang="pl-PL" dirty="0"/>
+              <a:t> </a:t>
+            </a:r>
+            <a:r>
+              <a:rPr lang="pl-PL" dirty="0" err="1"/>
+              <a:t>ronic</a:t>
+            </a:r>
+            <a:r>
+              <a:rPr lang="pl-PL" dirty="0"/>
+              <a:t>, </a:t>
+            </a:r>
+            <a:r>
+              <a:rPr lang="pl-PL" dirty="0" err="1"/>
+              <a:t>az</a:t>
+            </a:r>
+            <a:r>
+              <a:rPr lang="pl-PL" dirty="0"/>
+              <a:t> 22 sprawy (44%) </a:t>
+            </a:r>
+            <a:r>
+              <a:rPr lang="pl-PL" dirty="0" err="1"/>
+              <a:t>sa</a:t>
+            </a:r>
+            <a:r>
+              <a:rPr lang="pl-PL" dirty="0"/>
+              <a:t> z kodem kraju 'PL', 10 (20%) spraw jest z kodem 'ZZ’ (niezdefiniowany kraj). Dla </a:t>
+            </a:r>
+            <a:r>
+              <a:rPr lang="pl-PL" dirty="0" err="1"/>
+              <a:t>pozostalych</a:t>
+            </a:r>
+            <a:r>
+              <a:rPr lang="pl-PL" dirty="0"/>
+              <a:t> </a:t>
+            </a:r>
+            <a:r>
+              <a:rPr lang="pl-PL" dirty="0" err="1"/>
+              <a:t>kodow</a:t>
+            </a:r>
+            <a:r>
+              <a:rPr lang="pl-PL" dirty="0"/>
+              <a:t> </a:t>
+            </a:r>
+            <a:r>
+              <a:rPr lang="pl-PL" dirty="0" err="1"/>
+              <a:t>wnioskow</a:t>
+            </a:r>
+            <a:r>
+              <a:rPr lang="pl-PL" dirty="0"/>
+              <a:t> nie jest </a:t>
+            </a:r>
+            <a:r>
+              <a:rPr lang="pl-PL" dirty="0" err="1"/>
+              <a:t>wiecej</a:t>
+            </a:r>
+            <a:r>
+              <a:rPr lang="pl-PL" dirty="0"/>
+              <a:t>, niż 5.</a:t>
+            </a:r>
+          </a:p>
+          <a:p>
+            <a:pPr marL="0" indent="0">
+              <a:buNone/>
+            </a:pPr>
+            <a:r>
+              <a:rPr lang="pl-PL" dirty="0"/>
+              <a:t>	b) tabelarycznie po partnerze. Wniosek: -- W wyliczonym zakresie </a:t>
+            </a:r>
+            <a:r>
+              <a:rPr lang="pl-PL" dirty="0" err="1"/>
+              <a:t>sa</a:t>
+            </a:r>
+            <a:r>
+              <a:rPr lang="pl-PL" dirty="0"/>
+              <a:t> po cztery sprawy partnera </a:t>
+            </a:r>
+            <a:r>
+              <a:rPr lang="pl-PL" dirty="0" err="1"/>
+              <a:t>kiribati</a:t>
+            </a:r>
+            <a:r>
+              <a:rPr lang="pl-PL" dirty="0"/>
+              <a:t> i tui. Dla </a:t>
+            </a:r>
+            <a:r>
+              <a:rPr lang="pl-PL" dirty="0" err="1"/>
+              <a:t>pozostalych</a:t>
+            </a:r>
+            <a:r>
+              <a:rPr lang="pl-PL" dirty="0"/>
+              <a:t> </a:t>
+            </a:r>
+            <a:r>
+              <a:rPr lang="pl-PL" dirty="0" err="1"/>
+              <a:t>wnioskow</a:t>
+            </a:r>
+            <a:r>
+              <a:rPr lang="pl-PL" dirty="0"/>
+              <a:t> nie mamy informacji o partnerze (</a:t>
+            </a:r>
+            <a:r>
+              <a:rPr lang="pl-PL" dirty="0" err="1"/>
+              <a:t>null</a:t>
+            </a:r>
+            <a:r>
+              <a:rPr lang="pl-PL" dirty="0"/>
+              <a:t>).</a:t>
+            </a:r>
+          </a:p>
+          <a:p>
+            <a:pPr marL="457200" lvl="1" indent="0">
+              <a:buNone/>
+            </a:pPr>
+            <a:endParaRPr lang="pl-PL" dirty="0"/>
+          </a:p>
+          <a:p>
+            <a:pPr marL="0" indent="0">
+              <a:buNone/>
+            </a:pPr>
+            <a:r>
+              <a:rPr lang="pl-PL" dirty="0"/>
+              <a:t>1.3 – </a:t>
+            </a:r>
+            <a:r>
+              <a:rPr lang="pl-PL" i="1" dirty="0"/>
+              <a:t>nieistotny, ujęty w 1.2a)</a:t>
+            </a:r>
+            <a:endParaRPr lang="pl-PL" dirty="0"/>
+          </a:p>
+          <a:p>
+            <a:pPr marL="0" indent="0">
+              <a:buNone/>
+            </a:pPr>
+            <a:r>
+              <a:rPr lang="pl-PL" dirty="0"/>
+              <a:t>1.4 -- Sprawdzenie wszystkich </a:t>
+            </a:r>
+            <a:r>
+              <a:rPr lang="pl-PL" dirty="0" err="1"/>
+              <a:t>wnioskow</a:t>
+            </a:r>
+            <a:r>
+              <a:rPr lang="pl-PL" dirty="0"/>
+              <a:t> z </a:t>
+            </a:r>
+            <a:r>
+              <a:rPr lang="pl-PL" dirty="0" err="1"/>
+              <a:t>ronic</a:t>
+            </a:r>
+            <a:r>
+              <a:rPr lang="pl-PL" dirty="0"/>
+              <a:t> </a:t>
+            </a:r>
+            <a:r>
+              <a:rPr lang="pl-PL" dirty="0" err="1"/>
+              <a:t>pomiedzy</a:t>
+            </a:r>
+            <a:r>
+              <a:rPr lang="pl-PL" dirty="0"/>
+              <a:t> kwotami wnioskowanymi, a </a:t>
+            </a:r>
+            <a:r>
+              <a:rPr lang="pl-PL" dirty="0" err="1"/>
+              <a:t>wyplaconymi</a:t>
+            </a:r>
+            <a:r>
+              <a:rPr lang="pl-PL" dirty="0"/>
+              <a:t>.</a:t>
+            </a:r>
+          </a:p>
+          <a:p>
+            <a:pPr marL="0" indent="0">
+              <a:buNone/>
+            </a:pPr>
+            <a:r>
+              <a:rPr lang="pl-PL" dirty="0"/>
+              <a:t>Wniosek: -- </a:t>
+            </a:r>
+            <a:r>
+              <a:rPr lang="pl-PL" dirty="0" err="1"/>
+              <a:t>Najwiecej</a:t>
+            </a:r>
+            <a:r>
+              <a:rPr lang="pl-PL" dirty="0"/>
+              <a:t> jest </a:t>
+            </a:r>
+            <a:r>
+              <a:rPr lang="pl-PL" dirty="0" err="1"/>
+              <a:t>wnioskow</a:t>
+            </a:r>
+            <a:r>
+              <a:rPr lang="pl-PL" dirty="0"/>
+              <a:t> z kodem kraju 'ZZ'- 1573, </a:t>
+            </a:r>
+            <a:r>
+              <a:rPr lang="pl-PL" dirty="0" err="1"/>
+              <a:t>nastepnie</a:t>
+            </a:r>
+            <a:r>
+              <a:rPr lang="pl-PL" dirty="0"/>
+              <a:t> z kodem kraju 'IE' - 371 i 'PL' - 272 (11,66%).</a:t>
+            </a:r>
+          </a:p>
+          <a:p>
+            <a:pPr marL="0" indent="0">
+              <a:buNone/>
+            </a:pPr>
+            <a:br>
+              <a:rPr lang="pl-PL" dirty="0"/>
+            </a:br>
+            <a:endParaRPr lang="pl-PL" dirty="0"/>
+          </a:p>
+          <a:p>
+            <a:pPr marL="457200" lvl="1" indent="0">
+              <a:buNone/>
+            </a:pPr>
+            <a:endParaRPr lang="pl-PL" dirty="0"/>
+          </a:p>
+          <a:p>
+            <a:pPr marL="457200" lvl="1" indent="0">
+              <a:buNone/>
+            </a:pPr>
+            <a:endParaRPr lang="pl-PL" dirty="0"/>
+          </a:p>
+          <a:p>
+            <a:pPr marL="971550" lvl="1" indent="-514350">
+              <a:buAutoNum type="arabicPeriod"/>
+            </a:pPr>
+            <a:endParaRPr lang="pl-PL" dirty="0"/>
+          </a:p>
+          <a:p>
+            <a:endParaRPr lang="pl-PL" dirty="0"/>
+          </a:p>
+        </p:txBody>
+      </p:sp>
+    </p:spTree>
+    <p:extLst>
+      <p:ext uri="{BB962C8B-B14F-4D97-AF65-F5344CB8AC3E}">
+        <p14:creationId xmlns:p14="http://schemas.microsoft.com/office/powerpoint/2010/main" val="653871211"/>
+      </p:ext>
+    </p:extLst>
+  </p:cSld>
+  <p:clrMapOvr>
+    <a:masterClrMapping/>
+  </p:clrMapOvr>
+</p:sld>
+</file>
+
+<file path=ppt/slides/slide7.xml><?xml version="1.0" encoding="utf-8"?>
+<p:sld xmlns:a="http://schemas.openxmlformats.org/drawingml/2006/main" xmlns:r="http://schemas.openxmlformats.org/officeDocument/2006/relationships" xmlns:p="http://schemas.openxmlformats.org/presentationml/2006/main">
+  <p:cSld>
+    <p:spTree>
+      <p:nvGrpSpPr>
+        <p:cNvPr id="1" name=""/>
+        <p:cNvGrpSpPr/>
+        <p:nvPr/>
+      </p:nvGrpSpPr>
+      <p:grpSpPr>
+        <a:xfrm>
+          <a:off x="0" y="0"/>
+          <a:ext cx="0" cy="0"/>
+          <a:chOff x="0" y="0"/>
+          <a:chExt cx="0" cy="0"/>
+        </a:xfrm>
+      </p:grpSpPr>
+      <p:sp>
+        <p:nvSpPr>
+          <p:cNvPr id="2" name="Tytuł 1">
+            <a:extLst>
+              <a:ext uri="{FF2B5EF4-FFF2-40B4-BE49-F238E27FC236}">
+                <a16:creationId xmlns:a16="http://schemas.microsoft.com/office/drawing/2014/main" id="{06036E09-C52B-C247-BB3F-84D45EF4BDF4}"/>
+              </a:ext>
+            </a:extLst>
+          </p:cNvPr>
+          <p:cNvSpPr>
+            <a:spLocks noGrp="1"/>
+          </p:cNvSpPr>
+          <p:nvPr>
+            <p:ph type="title"/>
+          </p:nvPr>
+        </p:nvSpPr>
+        <p:spPr/>
+        <p:txBody>
+          <a:bodyPr/>
+          <a:lstStyle/>
+          <a:p>
+            <a:r>
+              <a:rPr lang="pl-PL" dirty="0"/>
+              <a:t>(draft) definicja analizowanego zbioru</a:t>
+            </a:r>
+          </a:p>
+        </p:txBody>
+      </p:sp>
+      <p:sp>
+        <p:nvSpPr>
+          <p:cNvPr id="3" name="Symbol zastępczy zawartości 2">
+            <a:extLst>
+              <a:ext uri="{FF2B5EF4-FFF2-40B4-BE49-F238E27FC236}">
+                <a16:creationId xmlns:a16="http://schemas.microsoft.com/office/drawing/2014/main" id="{90D1D634-8316-1E49-A123-64C4580983B6}"/>
+              </a:ext>
+            </a:extLst>
+          </p:cNvPr>
+          <p:cNvSpPr>
+            <a:spLocks noGrp="1"/>
+          </p:cNvSpPr>
+          <p:nvPr>
+            <p:ph idx="1"/>
+          </p:nvPr>
+        </p:nvSpPr>
+        <p:spPr/>
+        <p:txBody>
+          <a:bodyPr/>
+          <a:lstStyle/>
+          <a:p>
+            <a:pPr marL="0" indent="0">
+              <a:buNone/>
+            </a:pPr>
+            <a:r>
+              <a:rPr lang="pl-PL" dirty="0"/>
+              <a:t>2. 10-15% </a:t>
+            </a:r>
+            <a:r>
+              <a:rPr lang="pl-PL" dirty="0" err="1"/>
+              <a:t>najwiekszych</a:t>
+            </a:r>
+            <a:r>
+              <a:rPr lang="pl-PL" dirty="0"/>
+              <a:t> </a:t>
+            </a:r>
+            <a:r>
+              <a:rPr lang="pl-PL" dirty="0" err="1"/>
+              <a:t>roznic</a:t>
+            </a:r>
+            <a:r>
+              <a:rPr lang="pl-PL" dirty="0"/>
+              <a:t> procentowych / Mateusz</a:t>
+            </a:r>
+          </a:p>
+          <a:p>
+            <a:pPr marL="0" indent="0">
+              <a:buNone/>
+            </a:pPr>
+            <a:r>
+              <a:rPr lang="pl-PL" dirty="0"/>
+              <a:t>3.Liczba </a:t>
+            </a:r>
+            <a:r>
+              <a:rPr lang="pl-PL" dirty="0" err="1"/>
+              <a:t>wnioskow</a:t>
+            </a:r>
+            <a:r>
+              <a:rPr lang="pl-PL" dirty="0"/>
+              <a:t> </a:t>
+            </a:r>
+            <a:r>
+              <a:rPr lang="pl-PL" dirty="0" err="1"/>
+              <a:t>powyzej</a:t>
+            </a:r>
+            <a:r>
+              <a:rPr lang="pl-PL" dirty="0"/>
+              <a:t> mediany / Liliana</a:t>
+            </a:r>
+          </a:p>
+          <a:p>
+            <a:pPr marL="0" indent="0">
+              <a:buNone/>
+            </a:pPr>
+            <a:r>
+              <a:rPr lang="pl-PL" dirty="0"/>
+              <a:t> 4. </a:t>
+            </a:r>
+            <a:r>
+              <a:rPr lang="pl-PL" dirty="0" err="1"/>
+              <a:t>zbadac</a:t>
+            </a:r>
+            <a:r>
+              <a:rPr lang="pl-PL" dirty="0"/>
+              <a:t> skrajne </a:t>
+            </a:r>
+            <a:r>
+              <a:rPr lang="pl-PL" dirty="0" err="1"/>
+              <a:t>wartosci</a:t>
+            </a:r>
+            <a:r>
+              <a:rPr lang="pl-PL" dirty="0"/>
+              <a:t> 5% / Micha� </a:t>
+            </a:r>
+          </a:p>
+          <a:p>
+            <a:endParaRPr lang="pl-PL" dirty="0"/>
+          </a:p>
+        </p:txBody>
+      </p:sp>
+    </p:spTree>
+    <p:extLst>
+      <p:ext uri="{BB962C8B-B14F-4D97-AF65-F5344CB8AC3E}">
+        <p14:creationId xmlns:p14="http://schemas.microsoft.com/office/powerpoint/2010/main" val="2188027762"/>
+      </p:ext>
+    </p:extLst>
+  </p:cSld>
+  <p:clrMapOvr>
+    <a:masterClrMapping/>
+  </p:clrMapOvr>
+</p:sld>
+</file>
+
+<file path=ppt/slides/slide8.xml><?xml version="1.0" encoding="utf-8"?>
+<p:sld xmlns:a="http://schemas.openxmlformats.org/drawingml/2006/main" xmlns:r="http://schemas.openxmlformats.org/officeDocument/2006/relationships" xmlns:p="http://schemas.openxmlformats.org/presentationml/2006/main">
+  <p:cSld>
+    <p:spTree>
+      <p:nvGrpSpPr>
+        <p:cNvPr id="1" name=""/>
+        <p:cNvGrpSpPr/>
+        <p:nvPr/>
+      </p:nvGrpSpPr>
+      <p:grpSpPr>
+        <a:xfrm>
+          <a:off x="0" y="0"/>
+          <a:ext cx="0" cy="0"/>
+          <a:chOff x="0" y="0"/>
+          <a:chExt cx="0" cy="0"/>
+        </a:xfrm>
+      </p:grpSpPr>
+      <p:sp>
+        <p:nvSpPr>
+          <p:cNvPr id="2" name="Tytuł 1">
+            <a:extLst>
+              <a:ext uri="{FF2B5EF4-FFF2-40B4-BE49-F238E27FC236}">
+                <a16:creationId xmlns:a16="http://schemas.microsoft.com/office/drawing/2014/main" id="{AAC1C45C-B492-0945-B41A-A57BE41DC5CF}"/>
+              </a:ext>
+            </a:extLst>
+          </p:cNvPr>
+          <p:cNvSpPr>
+            <a:spLocks noGrp="1"/>
+          </p:cNvSpPr>
+          <p:nvPr>
+            <p:ph type="title"/>
+          </p:nvPr>
+        </p:nvSpPr>
+        <p:spPr/>
+        <p:txBody>
+          <a:bodyPr/>
+          <a:lstStyle/>
+          <a:p>
+            <a:r>
+              <a:rPr lang="pl-PL" dirty="0"/>
+              <a:t>(draft) Kolejne kroki analizy na zdefiniowanym zbiorze</a:t>
+            </a:r>
+          </a:p>
+        </p:txBody>
+      </p:sp>
+      <p:sp>
+        <p:nvSpPr>
+          <p:cNvPr id="3" name="Symbol zastępczy zawartości 2">
+            <a:extLst>
+              <a:ext uri="{FF2B5EF4-FFF2-40B4-BE49-F238E27FC236}">
+                <a16:creationId xmlns:a16="http://schemas.microsoft.com/office/drawing/2014/main" id="{998B763E-6429-9C47-B3C3-81E6399D3535}"/>
+              </a:ext>
+            </a:extLst>
+          </p:cNvPr>
+          <p:cNvSpPr>
+            <a:spLocks noGrp="1"/>
+          </p:cNvSpPr>
+          <p:nvPr>
+            <p:ph idx="1"/>
+          </p:nvPr>
+        </p:nvSpPr>
+        <p:spPr/>
+        <p:txBody>
+          <a:bodyPr>
+            <a:normAutofit/>
+          </a:bodyPr>
+          <a:lstStyle/>
+          <a:p>
+            <a:pPr marL="0" indent="0">
+              <a:buNone/>
+            </a:pPr>
+            <a:r>
+              <a:rPr lang="pl-PL" dirty="0"/>
+              <a:t>Analiza:</a:t>
+            </a:r>
+          </a:p>
+          <a:p>
+            <a:pPr marL="0" indent="0">
+              <a:buNone/>
+            </a:pPr>
+            <a:r>
+              <a:rPr lang="pl-PL" dirty="0"/>
+              <a:t>5.rozklad czasu</a:t>
+            </a:r>
+          </a:p>
+          <a:p>
+            <a:pPr marL="0" indent="0">
+              <a:buNone/>
+            </a:pPr>
+            <a:r>
+              <a:rPr lang="pl-PL" dirty="0"/>
+              <a:t>6.wplyw partnera</a:t>
+            </a:r>
+          </a:p>
+          <a:p>
+            <a:pPr marL="0" indent="0">
+              <a:buNone/>
+            </a:pPr>
+            <a:r>
+              <a:rPr lang="pl-PL" dirty="0"/>
+              <a:t>7.wplyw kod kraju</a:t>
+            </a:r>
+          </a:p>
+          <a:p>
+            <a:pPr marL="0" indent="0">
+              <a:buNone/>
+            </a:pPr>
+            <a:r>
+              <a:rPr lang="pl-PL" dirty="0"/>
+              <a:t>8.wplyw klient biznesowy</a:t>
+            </a:r>
+          </a:p>
+          <a:p>
+            <a:pPr marL="0" indent="0">
+              <a:buNone/>
+            </a:pPr>
+            <a:r>
+              <a:rPr lang="pl-PL" dirty="0"/>
+              <a:t>9.wplyw liczba </a:t>
+            </a:r>
+            <a:r>
+              <a:rPr lang="pl-PL" dirty="0" err="1"/>
+              <a:t>pasazerow</a:t>
+            </a:r>
+            <a:endParaRPr lang="pl-PL" dirty="0"/>
+          </a:p>
+          <a:p>
+            <a:endParaRPr lang="pl-PL" dirty="0"/>
+          </a:p>
+        </p:txBody>
+      </p:sp>
+    </p:spTree>
+    <p:extLst>
+      <p:ext uri="{BB962C8B-B14F-4D97-AF65-F5344CB8AC3E}">
+        <p14:creationId xmlns:p14="http://schemas.microsoft.com/office/powerpoint/2010/main" val="102722975"/>
+      </p:ext>
+    </p:extLst>
+  </p:cSld>
+  <p:clrMapOvr>
+    <a:masterClrMapping/>
+  </p:clrMapOvr>
+</p:sld>
+</file>
+
+<file path=ppt/slides/slide9.xml><?xml version="1.0" encoding="utf-8"?>
+<p:sld xmlns:a="http://schemas.openxmlformats.org/drawingml/2006/main" xmlns:r="http://schemas.openxmlformats.org/officeDocument/2006/relationships" xmlns:p="http://schemas.openxmlformats.org/presentationml/2006/main">
+  <p:cSld>
+    <p:spTree>
+      <p:nvGrpSpPr>
+        <p:cNvPr id="1" name=""/>
+        <p:cNvGrpSpPr/>
+        <p:nvPr/>
+      </p:nvGrpSpPr>
+      <p:grpSpPr>
+        <a:xfrm>
+          <a:off x="0" y="0"/>
+          <a:ext cx="0" cy="0"/>
+          <a:chOff x="0" y="0"/>
+          <a:chExt cx="0" cy="0"/>
+        </a:xfrm>
+      </p:grpSpPr>
+      <p:sp>
+        <p:nvSpPr>
+          <p:cNvPr id="2" name="Tytuł 1">
+            <a:extLst>
+              <a:ext uri="{FF2B5EF4-FFF2-40B4-BE49-F238E27FC236}">
+                <a16:creationId xmlns:a16="http://schemas.microsoft.com/office/drawing/2014/main" id="{7DC17F75-58DA-46BC-9E5F-BDEB29B42EC3}"/>
+              </a:ext>
+            </a:extLst>
+          </p:cNvPr>
+          <p:cNvSpPr>
+            <a:spLocks noGrp="1"/>
+          </p:cNvSpPr>
+          <p:nvPr>
+            <p:ph type="title"/>
+          </p:nvPr>
+        </p:nvSpPr>
+        <p:spPr>
+          <a:xfrm>
+            <a:off x="839788" y="457200"/>
+            <a:ext cx="3932237" cy="395056"/>
+          </a:xfrm>
+        </p:spPr>
+        <p:txBody>
+          <a:bodyPr>
+            <a:normAutofit/>
+          </a:bodyPr>
+          <a:lstStyle/>
+          <a:p>
+            <a:pPr algn="ctr"/>
+            <a:r>
+              <a:rPr lang="pl-PL" sz="1600" b="1" dirty="0"/>
+              <a:t>Analiza różnic z uwagi na rok wypłacenia.</a:t>
+            </a:r>
+          </a:p>
+        </p:txBody>
+      </p:sp>
+      <p:pic>
+        <p:nvPicPr>
+          <p:cNvPr id="5" name="Symbol zastępczy obrazu 4">
+            <a:extLst>
+              <a:ext uri="{FF2B5EF4-FFF2-40B4-BE49-F238E27FC236}">
+                <a16:creationId xmlns:a16="http://schemas.microsoft.com/office/drawing/2014/main" id="{85158475-A68D-4152-B537-D497AF148565}"/>
+              </a:ext>
+            </a:extLst>
+          </p:cNvPr>
+          <p:cNvPicPr>
+            <a:picLocks noGrp="1" noChangeAspect="1"/>
+          </p:cNvPicPr>
+          <p:nvPr>
+            <p:ph type="pic" idx="1"/>
+          </p:nvPr>
+        </p:nvPicPr>
+        <p:blipFill rotWithShape="1">
+          <a:blip r:embed="rId2"/>
+          <a:srcRect l="14382" r="23420" b="3734"/>
+          <a:stretch/>
+        </p:blipFill>
+        <p:spPr>
+          <a:xfrm>
+            <a:off x="4772026" y="0"/>
+            <a:ext cx="7419974" cy="6858001"/>
+          </a:xfrm>
+          <a:prstGeom prst="rect">
+            <a:avLst/>
+          </a:prstGeom>
+        </p:spPr>
+      </p:pic>
+      <p:sp>
+        <p:nvSpPr>
+          <p:cNvPr id="4" name="Symbol zastępczy tekstu 3">
+            <a:extLst>
+              <a:ext uri="{FF2B5EF4-FFF2-40B4-BE49-F238E27FC236}">
+                <a16:creationId xmlns:a16="http://schemas.microsoft.com/office/drawing/2014/main" id="{AE242361-A21D-4C64-B6C6-B19BDB064116}"/>
+              </a:ext>
+            </a:extLst>
+          </p:cNvPr>
+          <p:cNvSpPr>
+            <a:spLocks noGrp="1"/>
+          </p:cNvSpPr>
+          <p:nvPr>
+            <p:ph type="body" sz="half" idx="2"/>
+          </p:nvPr>
+        </p:nvSpPr>
+        <p:spPr>
+          <a:xfrm>
+            <a:off x="839788" y="1127464"/>
+            <a:ext cx="3932237" cy="4741524"/>
+          </a:xfrm>
+        </p:spPr>
+        <p:txBody>
+          <a:bodyPr/>
+          <a:lstStyle/>
+          <a:p>
+            <a:pPr algn="just"/>
+            <a:r>
+              <a:rPr lang="pl-PL" dirty="0"/>
+              <a:t>Suma różnic pomiędzy rekompensatami wnioskowanymi, a wypłaconymi, rosła równolegle do liczby wniosków.  Wzrost tych wartości następował z każdym kolejnym rokiem (dane z 2018 r. obejmują tylko początek roku). Nie stwierdziliśmy, żeby któryś rok wyróżniał się na tle lat pozostałych.</a:t>
+            </a:r>
+          </a:p>
+          <a:p>
+            <a:pPr algn="just"/>
+            <a:r>
+              <a:rPr lang="pl-PL" dirty="0"/>
+              <a:t>Średnie różnice wnioskowanych wypłaconych kwot również nie odbiegały od siebie </a:t>
+            </a:r>
+            <a:br>
+              <a:rPr lang="pl-PL" dirty="0"/>
+            </a:br>
+            <a:r>
+              <a:rPr lang="pl-PL" dirty="0"/>
+              <a:t>w badanych latach. Wskazane najwyższe kwoty różnic były przypadkami wyjątkowymi, które nie miały jednak wpływu na całość danych. </a:t>
+            </a:r>
+          </a:p>
+          <a:p>
+            <a:endParaRPr lang="pl-PL" dirty="0"/>
+          </a:p>
+        </p:txBody>
+      </p:sp>
+    </p:spTree>
+    <p:extLst>
+      <p:ext uri="{BB962C8B-B14F-4D97-AF65-F5344CB8AC3E}">
+        <p14:creationId xmlns:p14="http://schemas.microsoft.com/office/powerpoint/2010/main" val="1418438960"/>
       </p:ext>
     </p:extLst>
   </p:cSld>

</xml_diff>

<commit_message>
kolejne wykresy i aktualizacja prezentacji
</commit_message>
<xml_diff>
--- a/Apacze_projekt.pptx
+++ b/Apacze_projekt.pptx
@@ -4160,7 +4160,9 @@
         </p:nvSpPr>
         <p:spPr/>
         <p:txBody>
-          <a:bodyPr/>
+          <a:bodyPr>
+            <a:normAutofit fontScale="55000" lnSpcReduction="20000"/>
+          </a:bodyPr>
           <a:lstStyle/>
           <a:p>
             <a:pPr marL="0" indent="0">
@@ -4193,6 +4195,131 @@
             </a:pPr>
             <a:r>
               <a:rPr lang="pl-PL" dirty="0"/>
+              <a:t>	2.1. Liczba </a:t>
+            </a:r>
+            <a:r>
+              <a:rPr lang="pl-PL" dirty="0" err="1"/>
+              <a:t>wnioskow</a:t>
+            </a:r>
+            <a:r>
+              <a:rPr lang="pl-PL" dirty="0"/>
+              <a:t> wypłaconych</a:t>
+            </a:r>
+          </a:p>
+          <a:p>
+            <a:pPr marL="0" indent="0">
+              <a:buNone/>
+            </a:pPr>
+            <a:r>
+              <a:rPr lang="pl-PL" dirty="0"/>
+              <a:t>	2.1. </a:t>
+            </a:r>
+            <a:r>
+              <a:rPr lang="pl-PL" dirty="0" err="1"/>
+              <a:t>Roznice</a:t>
+            </a:r>
+            <a:r>
+              <a:rPr lang="pl-PL" dirty="0"/>
+              <a:t> procentowe powyżej 100% - 56</a:t>
+            </a:r>
+          </a:p>
+          <a:p>
+            <a:pPr marL="0" indent="0">
+              <a:buNone/>
+            </a:pPr>
+            <a:r>
+              <a:rPr lang="pl-PL" i="1" dirty="0"/>
+              <a:t>„</a:t>
+            </a:r>
+            <a:r>
+              <a:rPr lang="pl-PL" dirty="0"/>
+              <a:t> -- Tabela prezentuje </a:t>
+            </a:r>
+            <a:r>
+              <a:rPr lang="pl-PL" dirty="0" err="1"/>
+              <a:t>roznice</a:t>
+            </a:r>
+            <a:r>
+              <a:rPr lang="pl-PL" dirty="0"/>
+              <a:t> nominalne i </a:t>
+            </a:r>
+            <a:r>
+              <a:rPr lang="pl-PL" dirty="0" err="1"/>
+              <a:t>roznice</a:t>
+            </a:r>
+            <a:r>
+              <a:rPr lang="pl-PL" dirty="0"/>
+              <a:t> procentowe dla </a:t>
+            </a:r>
+            <a:r>
+              <a:rPr lang="pl-PL" dirty="0" err="1"/>
+              <a:t>wnioskow</a:t>
+            </a:r>
+            <a:r>
+              <a:rPr lang="pl-PL" dirty="0"/>
+              <a:t> tylko wypłaconych  i dla tych </a:t>
+            </a:r>
+            <a:r>
+              <a:rPr lang="pl-PL" dirty="0" err="1"/>
+              <a:t>ktorych</a:t>
+            </a:r>
+            <a:r>
+              <a:rPr lang="pl-PL" dirty="0"/>
+              <a:t> </a:t>
+            </a:r>
+            <a:r>
+              <a:rPr lang="pl-PL" dirty="0" err="1"/>
+              <a:t>roznica</a:t>
+            </a:r>
+            <a:r>
+              <a:rPr lang="pl-PL" dirty="0"/>
+              <a:t> </a:t>
+            </a:r>
+            <a:r>
+              <a:rPr lang="pl-PL" dirty="0" err="1"/>
+              <a:t>pomiedzy</a:t>
+            </a:r>
+            <a:r>
+              <a:rPr lang="pl-PL" dirty="0"/>
+              <a:t> kwota wnioskowana a </a:t>
+            </a:r>
+            <a:r>
+              <a:rPr lang="pl-PL" dirty="0" err="1"/>
+              <a:t>wyplacona</a:t>
+            </a:r>
+            <a:r>
+              <a:rPr lang="pl-PL" dirty="0"/>
+              <a:t> jest </a:t>
+            </a:r>
+            <a:r>
+              <a:rPr lang="pl-PL" dirty="0" err="1"/>
+              <a:t>wieksza</a:t>
+            </a:r>
+            <a:r>
+              <a:rPr lang="pl-PL" dirty="0"/>
+              <a:t> </a:t>
+            </a:r>
+            <a:r>
+              <a:rPr lang="pl-PL" dirty="0" err="1"/>
+              <a:t>niz</a:t>
+            </a:r>
+            <a:r>
+              <a:rPr lang="pl-PL" dirty="0"/>
+              <a:t> 100%”</a:t>
+            </a:r>
+          </a:p>
+          <a:p>
+            <a:pPr marL="0" indent="0">
+              <a:buNone/>
+            </a:pPr>
+            <a:endParaRPr lang="pl-PL" dirty="0"/>
+          </a:p>
+          <a:p>
+            <a:pPr marL="0" indent="0">
+              <a:buNone/>
+            </a:pPr>
+            <a:r>
+              <a:rPr lang="pl-PL" dirty="0"/>
               <a:t>3.Liczba </a:t>
             </a:r>
             <a:r>
@@ -4218,6 +4345,48 @@
             </a:pPr>
             <a:r>
               <a:rPr lang="pl-PL" dirty="0"/>
+              <a:t>	3.1. lista </a:t>
+            </a:r>
+            <a:r>
+              <a:rPr lang="pl-PL" dirty="0" err="1"/>
+              <a:t>wnioskow</a:t>
+            </a:r>
+            <a:r>
+              <a:rPr lang="pl-PL" dirty="0"/>
+              <a:t> powyżej mediany</a:t>
+            </a:r>
+          </a:p>
+          <a:p>
+            <a:pPr marL="0" indent="0">
+              <a:buNone/>
+            </a:pPr>
+            <a:r>
+              <a:rPr lang="pl-PL" dirty="0"/>
+              <a:t>	3.2. liczba </a:t>
+            </a:r>
+            <a:r>
+              <a:rPr lang="pl-PL" dirty="0" err="1"/>
+              <a:t>wnioskow</a:t>
+            </a:r>
+            <a:r>
+              <a:rPr lang="pl-PL" dirty="0"/>
+              <a:t> </a:t>
+            </a:r>
+            <a:r>
+              <a:rPr lang="pl-PL" dirty="0" err="1"/>
+              <a:t>powyzej</a:t>
+            </a:r>
+            <a:r>
+              <a:rPr lang="pl-PL" dirty="0"/>
+              <a:t> mediany </a:t>
+            </a:r>
+          </a:p>
+          <a:p>
+            <a:pPr marL="0" indent="0">
+              <a:buNone/>
+            </a:pPr>
+            <a:r>
+              <a:rPr lang="pl-PL" dirty="0"/>
               <a:t> 4. </a:t>
             </a:r>
             <a:r>
@@ -4234,7 +4403,150 @@
             </a:r>
             <a:r>
               <a:rPr lang="pl-PL" dirty="0"/>
-              <a:t> 5% / Micha� </a:t>
+              <a:t> 5% / </a:t>
+            </a:r>
+            <a:r>
+              <a:rPr lang="pl-PL" dirty="0" err="1"/>
+              <a:t>Michal</a:t>
+            </a:r>
+            <a:endParaRPr lang="pl-PL" dirty="0"/>
+          </a:p>
+          <a:p>
+            <a:pPr marL="0" indent="0">
+              <a:buNone/>
+            </a:pPr>
+            <a:r>
+              <a:rPr lang="pl-PL" dirty="0"/>
+              <a:t>Wykres 4.1. </a:t>
+            </a:r>
+          </a:p>
+          <a:p>
+            <a:pPr marL="0" indent="0">
+              <a:buNone/>
+            </a:pPr>
+            <a:r>
+              <a:rPr lang="pl-PL" dirty="0"/>
+              <a:t>Poniższe pokazuje </a:t>
+            </a:r>
+            <a:r>
+              <a:rPr lang="pl-PL" dirty="0" err="1"/>
+              <a:t>wartosc</a:t>
+            </a:r>
+            <a:r>
+              <a:rPr lang="pl-PL" dirty="0"/>
+              <a:t> zero dla wszystkich </a:t>
+            </a:r>
+            <a:r>
+              <a:rPr lang="pl-PL" dirty="0" err="1"/>
+              <a:t>kwartylow</a:t>
+            </a:r>
+            <a:r>
+              <a:rPr lang="pl-PL" dirty="0"/>
+              <a:t> mniejszych </a:t>
+            </a:r>
+            <a:r>
+              <a:rPr lang="pl-PL" dirty="0" err="1"/>
+              <a:t>niz</a:t>
+            </a:r>
+            <a:r>
+              <a:rPr lang="pl-PL" dirty="0"/>
+              <a:t> 0.99 (pierwszy mniejszy </a:t>
+            </a:r>
+            <a:r>
+              <a:rPr lang="pl-PL" dirty="0" err="1"/>
+              <a:t>kwartyl</a:t>
+            </a:r>
+            <a:r>
+              <a:rPr lang="pl-PL" dirty="0"/>
+              <a:t> to 0.95). Podstawa liczenia to nominalna </a:t>
+            </a:r>
+            <a:r>
+              <a:rPr lang="pl-PL" dirty="0" err="1"/>
+              <a:t>roznca</a:t>
+            </a:r>
+            <a:r>
+              <a:rPr lang="pl-PL" dirty="0"/>
+              <a:t> miedzy</a:t>
+            </a:r>
+          </a:p>
+          <a:p>
+            <a:r>
+              <a:rPr lang="pl-PL" dirty="0"/>
+              <a:t>-- kwota rekompensaty oryginalna a </a:t>
+            </a:r>
+            <a:r>
+              <a:rPr lang="pl-PL" dirty="0" err="1"/>
+              <a:t>wyplacona</a:t>
+            </a:r>
+            <a:r>
+              <a:rPr lang="pl-PL" dirty="0"/>
+              <a:t>. Dla </a:t>
+            </a:r>
+            <a:r>
+              <a:rPr lang="pl-PL" dirty="0" err="1"/>
+              <a:t>wartosci</a:t>
+            </a:r>
+            <a:r>
+              <a:rPr lang="pl-PL" dirty="0"/>
+              <a:t> </a:t>
+            </a:r>
+            <a:r>
+              <a:rPr lang="pl-PL" dirty="0" err="1"/>
+              <a:t>kwartyla</a:t>
+            </a:r>
+            <a:r>
+              <a:rPr lang="pl-PL" dirty="0"/>
+              <a:t> 0.99 </a:t>
+            </a:r>
+            <a:r>
+              <a:rPr lang="pl-PL" dirty="0" err="1"/>
+              <a:t>wartosc</a:t>
+            </a:r>
+            <a:r>
+              <a:rPr lang="pl-PL" dirty="0"/>
+              <a:t> </a:t>
+            </a:r>
+            <a:r>
+              <a:rPr lang="pl-PL" dirty="0" err="1"/>
+              <a:t>roznicy</a:t>
+            </a:r>
+            <a:r>
+              <a:rPr lang="pl-PL" dirty="0"/>
+              <a:t> wynosi 150.</a:t>
+            </a:r>
+          </a:p>
+          <a:p>
+            <a:pPr marL="0" indent="0">
+              <a:buNone/>
+            </a:pPr>
+            <a:r>
+              <a:rPr lang="pl-PL" dirty="0"/>
+              <a:t>Wykres 4.2</a:t>
+            </a:r>
+          </a:p>
+          <a:p>
+            <a:pPr marL="0" indent="0">
+              <a:buNone/>
+            </a:pPr>
+            <a:r>
+              <a:rPr lang="pl-PL" dirty="0"/>
+              <a:t>- </a:t>
+            </a:r>
+            <a:r>
+              <a:rPr lang="pl-PL" dirty="0" err="1"/>
+              <a:t>Ponizej</a:t>
+            </a:r>
+            <a:r>
+              <a:rPr lang="pl-PL" dirty="0"/>
+              <a:t> wypisane wnioski z </a:t>
+            </a:r>
+            <a:r>
+              <a:rPr lang="pl-PL" dirty="0" err="1"/>
+              <a:t>kwartylu</a:t>
+            </a:r>
+            <a:r>
+              <a:rPr lang="pl-PL" dirty="0"/>
+              <a:t> 0.99</a:t>
             </a:r>
           </a:p>
           <a:p>
@@ -4319,7 +4631,7 @@
         <p:spPr/>
         <p:txBody>
           <a:bodyPr>
-            <a:normAutofit/>
+            <a:normAutofit fontScale="92500" lnSpcReduction="10000"/>
           </a:bodyPr>
           <a:lstStyle/>
           <a:p>
@@ -4337,7 +4649,15 @@
             </a:pPr>
             <a:r>
               <a:rPr lang="pl-PL" dirty="0"/>
-              <a:t>5.rozklad czasu</a:t>
+              <a:t>5.Analiza </a:t>
+            </a:r>
+            <a:r>
+              <a:rPr lang="pl-PL" dirty="0" err="1"/>
+              <a:t>wplywu</a:t>
+            </a:r>
+            <a:r>
+              <a:rPr lang="pl-PL" dirty="0"/>
+              <a:t>:</a:t>
             </a:r>
           </a:p>
           <a:p>
@@ -4346,7 +4666,7 @@
             </a:pPr>
             <a:r>
               <a:rPr lang="pl-PL" dirty="0"/>
-              <a:t>6.wplyw partnera</a:t>
+              <a:t>	wykres 5.1.czas</a:t>
             </a:r>
           </a:p>
           <a:p>
@@ -4355,7 +4675,7 @@
             </a:pPr>
             <a:r>
               <a:rPr lang="pl-PL" dirty="0"/>
-              <a:t>7.wplyw kod kraju</a:t>
+              <a:t>	wykres 5.2. partner</a:t>
             </a:r>
           </a:p>
           <a:p>
@@ -4364,7 +4684,7 @@
             </a:pPr>
             <a:r>
               <a:rPr lang="pl-PL" dirty="0"/>
-              <a:t>8.wplyw klient biznesowy</a:t>
+              <a:t>	wykres 5.3. kraj</a:t>
             </a:r>
           </a:p>
           <a:p>
@@ -4373,12 +4693,121 @@
             </a:pPr>
             <a:r>
               <a:rPr lang="pl-PL" dirty="0"/>
-              <a:t>9.wplyw liczba </a:t>
+              <a:t>	wykres 5.4 klient biznesowy</a:t>
+            </a:r>
+          </a:p>
+          <a:p>
+            <a:pPr marL="0" indent="0">
+              <a:buNone/>
+            </a:pPr>
+            <a:r>
+              <a:rPr lang="pl-PL" dirty="0"/>
+              <a:t>	wykres 5.5 liczba </a:t>
             </a:r>
             <a:r>
               <a:rPr lang="pl-PL" dirty="0" err="1"/>
               <a:t>pasazerow</a:t>
             </a:r>
+            <a:endParaRPr lang="pl-PL" dirty="0"/>
+          </a:p>
+          <a:p>
+            <a:r>
+              <a:rPr lang="pl-PL" dirty="0"/>
+              <a:t>6. Podsumowanie </a:t>
+            </a:r>
+            <a:r>
+              <a:rPr lang="pl-PL" dirty="0" err="1"/>
+              <a:t>wnioskow</a:t>
+            </a:r>
+            <a:r>
+              <a:rPr lang="pl-PL" dirty="0"/>
+              <a:t> - ---- Komentarz: </a:t>
+            </a:r>
+            <a:r>
+              <a:rPr lang="pl-PL" dirty="0" err="1"/>
+              <a:t>Najwiecej</a:t>
+            </a:r>
+            <a:r>
+              <a:rPr lang="pl-PL" dirty="0"/>
+              <a:t> </a:t>
+            </a:r>
+            <a:r>
+              <a:rPr lang="pl-PL" dirty="0" err="1"/>
+              <a:t>róznic</a:t>
+            </a:r>
+            <a:r>
+              <a:rPr lang="pl-PL" dirty="0"/>
+              <a:t> </a:t>
+            </a:r>
+            <a:r>
+              <a:rPr lang="pl-PL" dirty="0" err="1"/>
+              <a:t>wystepuje</a:t>
+            </a:r>
+            <a:r>
+              <a:rPr lang="pl-PL" dirty="0"/>
+              <a:t> w lotach </a:t>
+            </a:r>
+            <a:r>
+              <a:rPr lang="pl-PL" dirty="0" err="1"/>
+              <a:t>pomiedzy</a:t>
+            </a:r>
+            <a:r>
+              <a:rPr lang="pl-PL" dirty="0"/>
+              <a:t> lotniskami </a:t>
+            </a:r>
+            <a:r>
+              <a:rPr lang="pl-PL"/>
+              <a:t>HHN-FRA, ---- </a:t>
+            </a:r>
+            <a:r>
+              <a:rPr lang="pl-PL" dirty="0"/>
+              <a:t>okazuje </a:t>
+            </a:r>
+            <a:r>
+              <a:rPr lang="pl-PL" dirty="0" err="1"/>
+              <a:t>sie</a:t>
+            </a:r>
+            <a:r>
+              <a:rPr lang="pl-PL" dirty="0"/>
+              <a:t> ze obydwa lotniska </a:t>
+            </a:r>
+            <a:r>
+              <a:rPr lang="pl-PL" dirty="0" err="1"/>
+              <a:t>znajduja</a:t>
+            </a:r>
+            <a:r>
+              <a:rPr lang="pl-PL" dirty="0"/>
+              <a:t> </a:t>
+            </a:r>
+            <a:r>
+              <a:rPr lang="pl-PL" dirty="0" err="1"/>
+              <a:t>sie</a:t>
+            </a:r>
+            <a:r>
+              <a:rPr lang="pl-PL" dirty="0"/>
+              <a:t> w Niemczech </a:t>
+            </a:r>
+            <a:r>
+              <a:rPr lang="pl-PL" dirty="0" err="1"/>
+              <a:t>najprawdopodniej</a:t>
+            </a:r>
+            <a:r>
+              <a:rPr lang="pl-PL" dirty="0"/>
+              <a:t> </a:t>
+            </a:r>
+            <a:r>
+              <a:rPr lang="pl-PL" dirty="0" err="1"/>
+              <a:t>blad</a:t>
+            </a:r>
+            <a:r>
+              <a:rPr lang="pl-PL" dirty="0"/>
+              <a:t> w bazie,</a:t>
+            </a:r>
+          </a:p>
+          <a:p>
+            <a:pPr marL="0" indent="0">
+              <a:buNone/>
+            </a:pPr>
             <a:endParaRPr lang="pl-PL" dirty="0"/>
           </a:p>
           <a:p>

</xml_diff>

<commit_message>
dodatkowe wykresy 1.7 i 1.8 oraz zmiany w prezentacji
</commit_message>
<xml_diff>
--- a/Apacze_projekt.pptx
+++ b/Apacze_projekt.pptx
@@ -3741,7 +3741,7 @@
         <p:spPr/>
         <p:txBody>
           <a:bodyPr>
-            <a:normAutofit fontScale="62500" lnSpcReduction="20000"/>
+            <a:normAutofit fontScale="47500" lnSpcReduction="20000"/>
           </a:bodyPr>
           <a:lstStyle/>
           <a:p>
@@ -3759,6 +3759,23 @@
             </a:pPr>
             <a:r>
               <a:rPr lang="pl-PL" dirty="0"/>
+              <a:t>Wykres 1.5. 2,75% wszystkich wniosków </a:t>
+            </a:r>
+            <a:r>
+              <a:rPr lang="pl-PL" dirty="0" err="1"/>
+              <a:t>wyplaconych</a:t>
+            </a:r>
+            <a:r>
+              <a:rPr lang="pl-PL" dirty="0"/>
+              <a:t> posiada różnice w rekompensatach</a:t>
+            </a:r>
+          </a:p>
+          <a:p>
+            <a:pPr marL="0" indent="0">
+              <a:buNone/>
+            </a:pPr>
+            <a:r>
+              <a:rPr lang="pl-PL" dirty="0"/>
               <a:t>Wykres 1.1. Sprawdzenie 50 największych </a:t>
             </a:r>
             <a:r>
@@ -3780,12 +3797,52 @@
             </a:r>
             <a:r>
               <a:rPr lang="pl-PL" dirty="0" err="1"/>
-              <a:t>ronic</a:t>
+              <a:t>roznic</a:t>
             </a:r>
             <a:r>
               <a:rPr lang="pl-PL" dirty="0"/>
               <a:t> w przedziale od 3.000,00 do 600,00 euro.</a:t>
             </a:r>
+          </a:p>
+          <a:p>
+            <a:pPr marL="0" indent="0">
+              <a:buNone/>
+            </a:pPr>
+            <a:r>
+              <a:rPr lang="pl-PL" dirty="0"/>
+              <a:t>Wykres 1.6 Mediana wynosi 125 EUR.</a:t>
+            </a:r>
+          </a:p>
+          <a:p>
+            <a:pPr marL="0" indent="0">
+              <a:buNone/>
+            </a:pPr>
+            <a:r>
+              <a:rPr lang="pl-PL" dirty="0"/>
+              <a:t>Wykres 1.7 analiza </a:t>
+            </a:r>
+            <a:r>
+              <a:rPr lang="pl-PL" dirty="0" err="1"/>
+              <a:t>wnioskow</a:t>
+            </a:r>
+            <a:r>
+              <a:rPr lang="pl-PL" dirty="0"/>
+              <a:t> wypłaconych powyżej mediany w ujęciu lat</a:t>
+            </a:r>
+          </a:p>
+          <a:p>
+            <a:pPr marL="0" indent="0">
+              <a:buNone/>
+            </a:pPr>
+            <a:r>
+              <a:rPr lang="pl-PL" dirty="0"/>
+              <a:t>Wykres 1.8 maksymalne kwoty </a:t>
+            </a:r>
+            <a:r>
+              <a:rPr lang="pl-PL"/>
+              <a:t>wyplat</a:t>
+            </a:r>
+            <a:endParaRPr lang="pl-PL" dirty="0"/>
           </a:p>
           <a:p>
             <a:pPr marL="0" indent="0">
@@ -4753,15 +4810,7 @@
             </a:r>
             <a:r>
               <a:rPr lang="pl-PL" dirty="0"/>
-              <a:t> lotniskami </a:t>
-            </a:r>
-            <a:r>
-              <a:rPr lang="pl-PL"/>
-              <a:t>HHN-FRA, ---- </a:t>
-            </a:r>
-            <a:r>
-              <a:rPr lang="pl-PL" dirty="0"/>
-              <a:t>okazuje </a:t>
+              <a:t> lotniskami HHN-FRA, ---- okazuje </a:t>
             </a:r>
             <a:r>
               <a:rPr lang="pl-PL" dirty="0" err="1"/>

</xml_diff>